<commit_message>
Finished EEMS (first edition)
</commit_message>
<xml_diff>
--- a/EEMS.pptx
+++ b/EEMS.pptx
@@ -7,6 +7,8 @@
   <p:sldIdLst>
     <p:sldId id="256" r:id="rId2"/>
     <p:sldId id="257" r:id="rId3"/>
+    <p:sldId id="258" r:id="rId4"/>
+    <p:sldId id="259" r:id="rId5"/>
   </p:sldIdLst>
   <p:sldSz cx="12192000" cy="6858000"/>
   <p:notesSz cx="6858000" cy="9144000"/>
@@ -105,6 +107,11 @@
       </a:defRPr>
     </a:lvl9pPr>
   </p:defaultTextStyle>
+  <p:extLst>
+    <p:ext uri="{EFAFB233-063F-42B5-8137-9DF3F51BA10A}">
+      <p15:sldGuideLst xmlns:p15="http://schemas.microsoft.com/office/powerpoint/2012/main"/>
+    </p:ext>
+  </p:extLst>
 </p:presentation>
 </file>
 
@@ -1026,7 +1033,7 @@
         <a:p>
           <a:r>
             <a:rPr lang="en-US" dirty="0"/>
-            <a:t>Habitat quality is high</a:t>
+            <a:t>Habitat value is high</a:t>
           </a:r>
         </a:p>
       </dgm:t>
@@ -1096,7 +1103,10 @@
         <a:bodyPr/>
         <a:lstStyle/>
         <a:p>
-          <a:endParaRPr lang="en-US" dirty="0"/>
+          <a:r>
+            <a:rPr lang="en-US" dirty="0"/>
+            <a:t>Uniqueness is high</a:t>
+          </a:r>
         </a:p>
       </dgm:t>
     </dgm:pt>
@@ -1114,6 +1124,158 @@
     <dgm:pt modelId="{8C7DAE97-BE0A-4640-A44C-4B0906E6BA61}" type="sibTrans" cxnId="{8E9A8197-6898-436F-BAA4-5097FE291AEE}">
       <dgm:prSet/>
       <dgm:spPr/>
+      <dgm:t>
+        <a:bodyPr/>
+        <a:lstStyle/>
+        <a:p>
+          <a:endParaRPr lang="en-US"/>
+        </a:p>
+      </dgm:t>
+    </dgm:pt>
+    <dgm:pt modelId="{19E77CD9-EE44-4C50-9A97-1A1CE80F1C0B}">
+      <dgm:prSet phldrT="[Text]"/>
+      <dgm:spPr/>
+      <dgm:t>
+        <a:bodyPr/>
+        <a:lstStyle/>
+        <a:p>
+          <a:r>
+            <a:rPr lang="en-US" dirty="0"/>
+            <a:t>Invasive species cover is low</a:t>
+          </a:r>
+        </a:p>
+      </dgm:t>
+    </dgm:pt>
+    <dgm:pt modelId="{6B34733D-417E-4A88-B66A-5B055DCA04AB}" type="parTrans" cxnId="{035EA516-BA0D-4C09-882B-AA5187C3EEC0}">
+      <dgm:prSet/>
+      <dgm:spPr/>
+      <dgm:t>
+        <a:bodyPr/>
+        <a:lstStyle/>
+        <a:p>
+          <a:endParaRPr lang="en-US"/>
+        </a:p>
+      </dgm:t>
+    </dgm:pt>
+    <dgm:pt modelId="{446569A6-B739-48CD-88C8-8553333B0349}" type="sibTrans" cxnId="{035EA516-BA0D-4C09-882B-AA5187C3EEC0}">
+      <dgm:prSet/>
+      <dgm:spPr/>
+      <dgm:t>
+        <a:bodyPr/>
+        <a:lstStyle/>
+        <a:p>
+          <a:endParaRPr lang="en-US"/>
+        </a:p>
+      </dgm:t>
+    </dgm:pt>
+    <dgm:pt modelId="{C7628974-0FC6-4E81-A619-A6A50727EB15}">
+      <dgm:prSet phldrT="[Text]"/>
+      <dgm:spPr/>
+      <dgm:t>
+        <a:bodyPr/>
+        <a:lstStyle/>
+        <a:p>
+          <a:r>
+            <a:rPr lang="en-US" dirty="0"/>
+            <a:t>Proportion of area of land cover type is low</a:t>
+          </a:r>
+        </a:p>
+      </dgm:t>
+    </dgm:pt>
+    <dgm:pt modelId="{3DD4D7DE-1347-4B4A-B334-31CE27C7A0AA}" type="parTrans" cxnId="{1688111C-FD7F-4956-9397-1AA86AFE1F7F}">
+      <dgm:prSet/>
+      <dgm:spPr/>
+      <dgm:t>
+        <a:bodyPr/>
+        <a:lstStyle/>
+        <a:p>
+          <a:endParaRPr lang="en-US"/>
+        </a:p>
+      </dgm:t>
+    </dgm:pt>
+    <dgm:pt modelId="{BD89CC80-7B0C-4C21-8D13-C1323DA78BDE}" type="sibTrans" cxnId="{1688111C-FD7F-4956-9397-1AA86AFE1F7F}">
+      <dgm:prSet/>
+      <dgm:spPr/>
+      <dgm:t>
+        <a:bodyPr/>
+        <a:lstStyle/>
+        <a:p>
+          <a:endParaRPr lang="en-US"/>
+        </a:p>
+      </dgm:t>
+    </dgm:pt>
+    <dgm:pt modelId="{56AA0889-DAD7-4038-B10B-7AC6A8294B79}">
+      <dgm:prSet phldrT="[Text]"/>
+      <dgm:spPr/>
+      <dgm:t>
+        <a:bodyPr/>
+        <a:lstStyle/>
+        <a:p>
+          <a:r>
+            <a:rPr lang="en-US" dirty="0"/>
+            <a:t>Stand age is high</a:t>
+          </a:r>
+        </a:p>
+      </dgm:t>
+    </dgm:pt>
+    <dgm:pt modelId="{E300B40C-0170-48F9-8B7B-D4D293C3F84E}" type="parTrans" cxnId="{E19CD785-3F24-402D-AB45-AE1BCBF388F6}">
+      <dgm:prSet/>
+      <dgm:spPr/>
+      <dgm:t>
+        <a:bodyPr/>
+        <a:lstStyle/>
+        <a:p>
+          <a:endParaRPr lang="en-US"/>
+        </a:p>
+      </dgm:t>
+    </dgm:pt>
+    <dgm:pt modelId="{3D29EA1F-0CF7-40BB-812C-E14830E47C71}" type="sibTrans" cxnId="{E19CD785-3F24-402D-AB45-AE1BCBF388F6}">
+      <dgm:prSet/>
+      <dgm:spPr/>
+      <dgm:t>
+        <a:bodyPr/>
+        <a:lstStyle/>
+        <a:p>
+          <a:endParaRPr lang="en-US"/>
+        </a:p>
+      </dgm:t>
+    </dgm:pt>
+    <dgm:pt modelId="{066FCE7F-1D38-4D62-AF82-7270DB60F02C}">
+      <dgm:prSet phldrT="[Text]"/>
+      <dgm:spPr/>
+      <dgm:t>
+        <a:bodyPr/>
+        <a:lstStyle/>
+        <a:p>
+          <a:r>
+            <a:rPr lang="en-US"/>
+            <a:t>Isolation is high</a:t>
+          </a:r>
+          <a:endParaRPr lang="en-US" dirty="0"/>
+        </a:p>
+      </dgm:t>
+    </dgm:pt>
+    <dgm:pt modelId="{0380E99F-4F48-4306-B59F-7933FC5BC8C4}" type="parTrans" cxnId="{37DAD4D8-AF8A-40FE-BA02-2FA739712C94}">
+      <dgm:prSet/>
+      <dgm:spPr/>
+      <dgm:t>
+        <a:bodyPr/>
+        <a:lstStyle/>
+        <a:p>
+          <a:endParaRPr lang="en-US"/>
+        </a:p>
+      </dgm:t>
+    </dgm:pt>
+    <dgm:pt modelId="{5D4707FD-0CB9-4578-A9E4-EC35ACBCB3B0}" type="sibTrans" cxnId="{37DAD4D8-AF8A-40FE-BA02-2FA739712C94}">
+      <dgm:prSet/>
+      <dgm:spPr/>
+      <dgm:t>
+        <a:bodyPr/>
+        <a:lstStyle/>
+        <a:p>
+          <a:endParaRPr lang="en-US"/>
+        </a:p>
+      </dgm:t>
     </dgm:pt>
     <dgm:pt modelId="{309BFFE9-5CC3-49C0-A135-09BF0F757068}" type="pres">
       <dgm:prSet presAssocID="{A3C7F65C-04AF-485E-83F1-42BA7230AF4A}" presName="diagram" presStyleCnt="0">
@@ -1144,11 +1306,11 @@
       <dgm:spPr/>
     </dgm:pt>
     <dgm:pt modelId="{61D63F57-2DD9-428B-9252-452CC5289E2A}" type="pres">
-      <dgm:prSet presAssocID="{444074BA-B5CA-412F-85AB-67AF292084F2}" presName="conn2-1" presStyleLbl="parChTrans1D2" presStyleIdx="0" presStyleCnt="2"/>
+      <dgm:prSet presAssocID="{444074BA-B5CA-412F-85AB-67AF292084F2}" presName="conn2-1" presStyleLbl="parChTrans1D2" presStyleIdx="0" presStyleCnt="3"/>
       <dgm:spPr/>
     </dgm:pt>
     <dgm:pt modelId="{CA718BED-4D9D-4130-9E7A-9E7D550BDEE7}" type="pres">
-      <dgm:prSet presAssocID="{444074BA-B5CA-412F-85AB-67AF292084F2}" presName="connTx" presStyleLbl="parChTrans1D2" presStyleIdx="0" presStyleCnt="2"/>
+      <dgm:prSet presAssocID="{444074BA-B5CA-412F-85AB-67AF292084F2}" presName="connTx" presStyleLbl="parChTrans1D2" presStyleIdx="0" presStyleCnt="3"/>
       <dgm:spPr/>
     </dgm:pt>
     <dgm:pt modelId="{200DC371-0929-43D0-827A-B844C82F4606}" type="pres">
@@ -1156,7 +1318,7 @@
       <dgm:spPr/>
     </dgm:pt>
     <dgm:pt modelId="{F555B95E-CE7C-4D14-BEB2-7DBD34640630}" type="pres">
-      <dgm:prSet presAssocID="{BBCAEBF3-E95D-4397-B63C-4F0D9311735E}" presName="LevelTwoTextNode" presStyleLbl="node2" presStyleIdx="0" presStyleCnt="2">
+      <dgm:prSet presAssocID="{BBCAEBF3-E95D-4397-B63C-4F0D9311735E}" presName="LevelTwoTextNode" presStyleLbl="node2" presStyleIdx="0" presStyleCnt="3">
         <dgm:presLayoutVars>
           <dgm:chPref val="3"/>
         </dgm:presLayoutVars>
@@ -1168,11 +1330,11 @@
       <dgm:spPr/>
     </dgm:pt>
     <dgm:pt modelId="{19BB2530-6D88-48D2-92C1-1B9E67C32339}" type="pres">
-      <dgm:prSet presAssocID="{48B96584-4BE4-488C-ACA0-5B00281287DA}" presName="conn2-1" presStyleLbl="parChTrans1D3" presStyleIdx="0" presStyleCnt="4"/>
+      <dgm:prSet presAssocID="{48B96584-4BE4-488C-ACA0-5B00281287DA}" presName="conn2-1" presStyleLbl="parChTrans1D3" presStyleIdx="0" presStyleCnt="7"/>
       <dgm:spPr/>
     </dgm:pt>
     <dgm:pt modelId="{C34E3B4F-7CDC-4F33-ACE9-EF8E5B032D6A}" type="pres">
-      <dgm:prSet presAssocID="{48B96584-4BE4-488C-ACA0-5B00281287DA}" presName="connTx" presStyleLbl="parChTrans1D3" presStyleIdx="0" presStyleCnt="4"/>
+      <dgm:prSet presAssocID="{48B96584-4BE4-488C-ACA0-5B00281287DA}" presName="connTx" presStyleLbl="parChTrans1D3" presStyleIdx="0" presStyleCnt="7"/>
       <dgm:spPr/>
     </dgm:pt>
     <dgm:pt modelId="{330BB0E0-8B79-4D61-ABBF-98453F0972EB}" type="pres">
@@ -1180,7 +1342,7 @@
       <dgm:spPr/>
     </dgm:pt>
     <dgm:pt modelId="{B1EA40FE-4AA1-498B-A8EB-F7E2AB14DA3D}" type="pres">
-      <dgm:prSet presAssocID="{7B91CAB5-A40C-4C19-9064-E67FC2828E86}" presName="LevelTwoTextNode" presStyleLbl="node3" presStyleIdx="0" presStyleCnt="4">
+      <dgm:prSet presAssocID="{7B91CAB5-A40C-4C19-9064-E67FC2828E86}" presName="LevelTwoTextNode" presStyleLbl="node3" presStyleIdx="0" presStyleCnt="7">
         <dgm:presLayoutVars>
           <dgm:chPref val="3"/>
         </dgm:presLayoutVars>
@@ -1192,11 +1354,11 @@
       <dgm:spPr/>
     </dgm:pt>
     <dgm:pt modelId="{A89F158F-7712-408E-945A-A4C00400EE0B}" type="pres">
-      <dgm:prSet presAssocID="{7988D76F-DC06-4919-9AE9-5315547E0C42}" presName="conn2-1" presStyleLbl="parChTrans1D3" presStyleIdx="1" presStyleCnt="4"/>
+      <dgm:prSet presAssocID="{7988D76F-DC06-4919-9AE9-5315547E0C42}" presName="conn2-1" presStyleLbl="parChTrans1D3" presStyleIdx="1" presStyleCnt="7"/>
       <dgm:spPr/>
     </dgm:pt>
     <dgm:pt modelId="{C22B8A83-6861-4BFD-8688-0E9193EC4738}" type="pres">
-      <dgm:prSet presAssocID="{7988D76F-DC06-4919-9AE9-5315547E0C42}" presName="connTx" presStyleLbl="parChTrans1D3" presStyleIdx="1" presStyleCnt="4"/>
+      <dgm:prSet presAssocID="{7988D76F-DC06-4919-9AE9-5315547E0C42}" presName="connTx" presStyleLbl="parChTrans1D3" presStyleIdx="1" presStyleCnt="7"/>
       <dgm:spPr/>
     </dgm:pt>
     <dgm:pt modelId="{E8188CC2-9CF5-44D9-8059-0787286D102F}" type="pres">
@@ -1204,7 +1366,7 @@
       <dgm:spPr/>
     </dgm:pt>
     <dgm:pt modelId="{B84191BE-BDF4-49E2-AD70-0FE61855A97A}" type="pres">
-      <dgm:prSet presAssocID="{57D993C6-0F0F-4A3A-AAB4-B072F52E2560}" presName="LevelTwoTextNode" presStyleLbl="node3" presStyleIdx="1" presStyleCnt="4">
+      <dgm:prSet presAssocID="{57D993C6-0F0F-4A3A-AAB4-B072F52E2560}" presName="LevelTwoTextNode" presStyleLbl="node3" presStyleIdx="1" presStyleCnt="7">
         <dgm:presLayoutVars>
           <dgm:chPref val="3"/>
         </dgm:presLayoutVars>
@@ -1216,11 +1378,11 @@
       <dgm:spPr/>
     </dgm:pt>
     <dgm:pt modelId="{91AC95CC-15D9-46B3-96CB-7948BA1A22D8}" type="pres">
-      <dgm:prSet presAssocID="{EC1EA087-B360-4D89-AA27-D8E4FDAE10AB}" presName="conn2-1" presStyleLbl="parChTrans1D2" presStyleIdx="1" presStyleCnt="2"/>
+      <dgm:prSet presAssocID="{EC1EA087-B360-4D89-AA27-D8E4FDAE10AB}" presName="conn2-1" presStyleLbl="parChTrans1D2" presStyleIdx="1" presStyleCnt="3"/>
       <dgm:spPr/>
     </dgm:pt>
     <dgm:pt modelId="{E03092BD-4C54-4927-9504-3D022EB93ED9}" type="pres">
-      <dgm:prSet presAssocID="{EC1EA087-B360-4D89-AA27-D8E4FDAE10AB}" presName="connTx" presStyleLbl="parChTrans1D2" presStyleIdx="1" presStyleCnt="2"/>
+      <dgm:prSet presAssocID="{EC1EA087-B360-4D89-AA27-D8E4FDAE10AB}" presName="connTx" presStyleLbl="parChTrans1D2" presStyleIdx="1" presStyleCnt="3"/>
       <dgm:spPr/>
     </dgm:pt>
     <dgm:pt modelId="{252B6916-D256-4DA3-AA40-936F1A159A5D}" type="pres">
@@ -1228,7 +1390,7 @@
       <dgm:spPr/>
     </dgm:pt>
     <dgm:pt modelId="{59F49743-08FA-427E-9202-61D78109282F}" type="pres">
-      <dgm:prSet presAssocID="{157FC0CA-C77A-43A1-AABA-A8C24403CC6F}" presName="LevelTwoTextNode" presStyleLbl="node2" presStyleIdx="1" presStyleCnt="2">
+      <dgm:prSet presAssocID="{157FC0CA-C77A-43A1-AABA-A8C24403CC6F}" presName="LevelTwoTextNode" presStyleLbl="node2" presStyleIdx="1" presStyleCnt="3">
         <dgm:presLayoutVars>
           <dgm:chPref val="3"/>
         </dgm:presLayoutVars>
@@ -1240,11 +1402,11 @@
       <dgm:spPr/>
     </dgm:pt>
     <dgm:pt modelId="{534EB12E-C94A-4B97-B491-FA208C1013EE}" type="pres">
-      <dgm:prSet presAssocID="{82F995F7-8B15-4800-99B2-8CA5C46AD143}" presName="conn2-1" presStyleLbl="parChTrans1D3" presStyleIdx="2" presStyleCnt="4"/>
+      <dgm:prSet presAssocID="{82F995F7-8B15-4800-99B2-8CA5C46AD143}" presName="conn2-1" presStyleLbl="parChTrans1D3" presStyleIdx="2" presStyleCnt="7"/>
       <dgm:spPr/>
     </dgm:pt>
     <dgm:pt modelId="{B8B65ED0-A4BD-460E-B145-1E5083E7162F}" type="pres">
-      <dgm:prSet presAssocID="{82F995F7-8B15-4800-99B2-8CA5C46AD143}" presName="connTx" presStyleLbl="parChTrans1D3" presStyleIdx="2" presStyleCnt="4"/>
+      <dgm:prSet presAssocID="{82F995F7-8B15-4800-99B2-8CA5C46AD143}" presName="connTx" presStyleLbl="parChTrans1D3" presStyleIdx="2" presStyleCnt="7"/>
       <dgm:spPr/>
     </dgm:pt>
     <dgm:pt modelId="{1133F70E-2842-4F51-87ED-9C2FFF6194E1}" type="pres">
@@ -1252,7 +1414,7 @@
       <dgm:spPr/>
     </dgm:pt>
     <dgm:pt modelId="{0839EF7C-F436-4435-A481-3646916AD670}" type="pres">
-      <dgm:prSet presAssocID="{7F815CBB-07DC-412F-8E27-050F57C62347}" presName="LevelTwoTextNode" presStyleLbl="node3" presStyleIdx="2" presStyleCnt="4">
+      <dgm:prSet presAssocID="{7F815CBB-07DC-412F-8E27-050F57C62347}" presName="LevelTwoTextNode" presStyleLbl="node3" presStyleIdx="2" presStyleCnt="7">
         <dgm:presLayoutVars>
           <dgm:chPref val="3"/>
         </dgm:presLayoutVars>
@@ -1263,58 +1425,170 @@
       <dgm:prSet presAssocID="{7F815CBB-07DC-412F-8E27-050F57C62347}" presName="level3hierChild" presStyleCnt="0"/>
       <dgm:spPr/>
     </dgm:pt>
-    <dgm:pt modelId="{11292AF2-07BF-401D-A1C9-29192876F5FA}" type="pres">
-      <dgm:prSet presAssocID="{B1688470-D2F6-4E4E-AAC8-D2A6ED0EDF29}" presName="conn2-1" presStyleLbl="parChTrans1D3" presStyleIdx="3" presStyleCnt="4"/>
-      <dgm:spPr/>
-    </dgm:pt>
-    <dgm:pt modelId="{B7B4939C-3713-4C69-B512-6DE5750808CC}" type="pres">
-      <dgm:prSet presAssocID="{B1688470-D2F6-4E4E-AAC8-D2A6ED0EDF29}" presName="connTx" presStyleLbl="parChTrans1D3" presStyleIdx="3" presStyleCnt="4"/>
-      <dgm:spPr/>
-    </dgm:pt>
-    <dgm:pt modelId="{F8074C30-DA36-4042-B6B1-A64890963829}" type="pres">
-      <dgm:prSet presAssocID="{6FF187A9-047E-49EF-804F-56E9381F2335}" presName="root2" presStyleCnt="0"/>
-      <dgm:spPr/>
-    </dgm:pt>
-    <dgm:pt modelId="{4878B0CD-1E68-4E4F-B15A-8E8637FE59A3}" type="pres">
-      <dgm:prSet presAssocID="{6FF187A9-047E-49EF-804F-56E9381F2335}" presName="LevelTwoTextNode" presStyleLbl="node3" presStyleIdx="3" presStyleCnt="4">
+    <dgm:pt modelId="{AAABA663-BDC6-4517-A47D-D7CF970A4EE5}" type="pres">
+      <dgm:prSet presAssocID="{6B34733D-417E-4A88-B66A-5B055DCA04AB}" presName="conn2-1" presStyleLbl="parChTrans1D3" presStyleIdx="3" presStyleCnt="7"/>
+      <dgm:spPr/>
+    </dgm:pt>
+    <dgm:pt modelId="{005094AE-2281-4CCB-A9CA-DEC88FD6BFB1}" type="pres">
+      <dgm:prSet presAssocID="{6B34733D-417E-4A88-B66A-5B055DCA04AB}" presName="connTx" presStyleLbl="parChTrans1D3" presStyleIdx="3" presStyleCnt="7"/>
+      <dgm:spPr/>
+    </dgm:pt>
+    <dgm:pt modelId="{2E2EC87A-BA72-42E9-AC03-C3A199310BCC}" type="pres">
+      <dgm:prSet presAssocID="{19E77CD9-EE44-4C50-9A97-1A1CE80F1C0B}" presName="root2" presStyleCnt="0"/>
+      <dgm:spPr/>
+    </dgm:pt>
+    <dgm:pt modelId="{E14EF143-C782-4EB9-B89E-9B5C0E9EEA8B}" type="pres">
+      <dgm:prSet presAssocID="{19E77CD9-EE44-4C50-9A97-1A1CE80F1C0B}" presName="LevelTwoTextNode" presStyleLbl="node3" presStyleIdx="3" presStyleCnt="7">
         <dgm:presLayoutVars>
           <dgm:chPref val="3"/>
         </dgm:presLayoutVars>
       </dgm:prSet>
       <dgm:spPr/>
     </dgm:pt>
+    <dgm:pt modelId="{A12C22C4-47C2-41EF-A5E1-4C3903D1C91A}" type="pres">
+      <dgm:prSet presAssocID="{19E77CD9-EE44-4C50-9A97-1A1CE80F1C0B}" presName="level3hierChild" presStyleCnt="0"/>
+      <dgm:spPr/>
+    </dgm:pt>
+    <dgm:pt modelId="{11292AF2-07BF-401D-A1C9-29192876F5FA}" type="pres">
+      <dgm:prSet presAssocID="{B1688470-D2F6-4E4E-AAC8-D2A6ED0EDF29}" presName="conn2-1" presStyleLbl="parChTrans1D2" presStyleIdx="2" presStyleCnt="3"/>
+      <dgm:spPr/>
+    </dgm:pt>
+    <dgm:pt modelId="{B7B4939C-3713-4C69-B512-6DE5750808CC}" type="pres">
+      <dgm:prSet presAssocID="{B1688470-D2F6-4E4E-AAC8-D2A6ED0EDF29}" presName="connTx" presStyleLbl="parChTrans1D2" presStyleIdx="2" presStyleCnt="3"/>
+      <dgm:spPr/>
+    </dgm:pt>
+    <dgm:pt modelId="{F8074C30-DA36-4042-B6B1-A64890963829}" type="pres">
+      <dgm:prSet presAssocID="{6FF187A9-047E-49EF-804F-56E9381F2335}" presName="root2" presStyleCnt="0"/>
+      <dgm:spPr/>
+    </dgm:pt>
+    <dgm:pt modelId="{4878B0CD-1E68-4E4F-B15A-8E8637FE59A3}" type="pres">
+      <dgm:prSet presAssocID="{6FF187A9-047E-49EF-804F-56E9381F2335}" presName="LevelTwoTextNode" presStyleLbl="node2" presStyleIdx="2" presStyleCnt="3">
+        <dgm:presLayoutVars>
+          <dgm:chPref val="3"/>
+        </dgm:presLayoutVars>
+      </dgm:prSet>
+      <dgm:spPr/>
+    </dgm:pt>
     <dgm:pt modelId="{F1805EB4-9D93-4569-9B43-B2DA98F2F140}" type="pres">
       <dgm:prSet presAssocID="{6FF187A9-047E-49EF-804F-56E9381F2335}" presName="level3hierChild" presStyleCnt="0"/>
+      <dgm:spPr/>
+    </dgm:pt>
+    <dgm:pt modelId="{D8FBD9FA-ADAE-444D-8602-A8A69D7BCAD6}" type="pres">
+      <dgm:prSet presAssocID="{0380E99F-4F48-4306-B59F-7933FC5BC8C4}" presName="conn2-1" presStyleLbl="parChTrans1D3" presStyleIdx="4" presStyleCnt="7"/>
+      <dgm:spPr/>
+    </dgm:pt>
+    <dgm:pt modelId="{E8FA6377-186D-41FA-882E-15D3D3767A94}" type="pres">
+      <dgm:prSet presAssocID="{0380E99F-4F48-4306-B59F-7933FC5BC8C4}" presName="connTx" presStyleLbl="parChTrans1D3" presStyleIdx="4" presStyleCnt="7"/>
+      <dgm:spPr/>
+    </dgm:pt>
+    <dgm:pt modelId="{2205E13A-E989-42A8-9A82-54D06F3B3592}" type="pres">
+      <dgm:prSet presAssocID="{066FCE7F-1D38-4D62-AF82-7270DB60F02C}" presName="root2" presStyleCnt="0"/>
+      <dgm:spPr/>
+    </dgm:pt>
+    <dgm:pt modelId="{5610D7B2-34B4-49A3-B461-3B83E6A9038E}" type="pres">
+      <dgm:prSet presAssocID="{066FCE7F-1D38-4D62-AF82-7270DB60F02C}" presName="LevelTwoTextNode" presStyleLbl="node3" presStyleIdx="4" presStyleCnt="7">
+        <dgm:presLayoutVars>
+          <dgm:chPref val="3"/>
+        </dgm:presLayoutVars>
+      </dgm:prSet>
+      <dgm:spPr/>
+    </dgm:pt>
+    <dgm:pt modelId="{8766A68E-A5C3-4990-A64A-89BDB01D279E}" type="pres">
+      <dgm:prSet presAssocID="{066FCE7F-1D38-4D62-AF82-7270DB60F02C}" presName="level3hierChild" presStyleCnt="0"/>
+      <dgm:spPr/>
+    </dgm:pt>
+    <dgm:pt modelId="{40ED7B85-DA85-416F-AE28-F4DD8067B665}" type="pres">
+      <dgm:prSet presAssocID="{3DD4D7DE-1347-4B4A-B334-31CE27C7A0AA}" presName="conn2-1" presStyleLbl="parChTrans1D3" presStyleIdx="5" presStyleCnt="7"/>
+      <dgm:spPr/>
+    </dgm:pt>
+    <dgm:pt modelId="{3B9EA1D6-976C-4EB5-8C6A-983A6E2E6014}" type="pres">
+      <dgm:prSet presAssocID="{3DD4D7DE-1347-4B4A-B334-31CE27C7A0AA}" presName="connTx" presStyleLbl="parChTrans1D3" presStyleIdx="5" presStyleCnt="7"/>
+      <dgm:spPr/>
+    </dgm:pt>
+    <dgm:pt modelId="{9F9402FB-270A-4A53-B1F6-53ACC775D7A1}" type="pres">
+      <dgm:prSet presAssocID="{C7628974-0FC6-4E81-A619-A6A50727EB15}" presName="root2" presStyleCnt="0"/>
+      <dgm:spPr/>
+    </dgm:pt>
+    <dgm:pt modelId="{0E2ACD24-4708-4A0E-B9DE-C3DAECC0A3EF}" type="pres">
+      <dgm:prSet presAssocID="{C7628974-0FC6-4E81-A619-A6A50727EB15}" presName="LevelTwoTextNode" presStyleLbl="node3" presStyleIdx="5" presStyleCnt="7">
+        <dgm:presLayoutVars>
+          <dgm:chPref val="3"/>
+        </dgm:presLayoutVars>
+      </dgm:prSet>
+      <dgm:spPr/>
+    </dgm:pt>
+    <dgm:pt modelId="{3F8EBD3A-F13A-4182-882B-4487B5C8DC30}" type="pres">
+      <dgm:prSet presAssocID="{C7628974-0FC6-4E81-A619-A6A50727EB15}" presName="level3hierChild" presStyleCnt="0"/>
+      <dgm:spPr/>
+    </dgm:pt>
+    <dgm:pt modelId="{FA38C550-A4E9-4E0C-A543-E976AFC6F9AC}" type="pres">
+      <dgm:prSet presAssocID="{E300B40C-0170-48F9-8B7B-D4D293C3F84E}" presName="conn2-1" presStyleLbl="parChTrans1D3" presStyleIdx="6" presStyleCnt="7"/>
+      <dgm:spPr/>
+    </dgm:pt>
+    <dgm:pt modelId="{CA66C94B-5E4E-4030-A313-F8C85D4764F9}" type="pres">
+      <dgm:prSet presAssocID="{E300B40C-0170-48F9-8B7B-D4D293C3F84E}" presName="connTx" presStyleLbl="parChTrans1D3" presStyleIdx="6" presStyleCnt="7"/>
+      <dgm:spPr/>
+    </dgm:pt>
+    <dgm:pt modelId="{507BCDBC-2B4B-42C8-9D4D-79A3158901E4}" type="pres">
+      <dgm:prSet presAssocID="{56AA0889-DAD7-4038-B10B-7AC6A8294B79}" presName="root2" presStyleCnt="0"/>
+      <dgm:spPr/>
+    </dgm:pt>
+    <dgm:pt modelId="{05210038-F275-4A49-9050-86DAC9D5F021}" type="pres">
+      <dgm:prSet presAssocID="{56AA0889-DAD7-4038-B10B-7AC6A8294B79}" presName="LevelTwoTextNode" presStyleLbl="node3" presStyleIdx="6" presStyleCnt="7">
+        <dgm:presLayoutVars>
+          <dgm:chPref val="3"/>
+        </dgm:presLayoutVars>
+      </dgm:prSet>
+      <dgm:spPr/>
+    </dgm:pt>
+    <dgm:pt modelId="{585713D5-731B-4D21-975D-7A251D015714}" type="pres">
+      <dgm:prSet presAssocID="{56AA0889-DAD7-4038-B10B-7AC6A8294B79}" presName="level3hierChild" presStyleCnt="0"/>
       <dgm:spPr/>
     </dgm:pt>
   </dgm:ptLst>
   <dgm:cxnLst>
     <dgm:cxn modelId="{EDE55C01-D9B7-4558-89E6-0C0821403FAB}" type="presOf" srcId="{BBCAEBF3-E95D-4397-B63C-4F0D9311735E}" destId="{F555B95E-CE7C-4D14-BEB2-7DBD34640630}" srcOrd="0" destOrd="0" presId="urn:microsoft.com/office/officeart/2005/8/layout/hierarchy2"/>
     <dgm:cxn modelId="{64C18D03-9DC3-4573-BC20-001DE015BEB8}" srcId="{F62B71B9-D782-45EE-B669-2EB26D7E1BC2}" destId="{BBCAEBF3-E95D-4397-B63C-4F0D9311735E}" srcOrd="0" destOrd="0" parTransId="{444074BA-B5CA-412F-85AB-67AF292084F2}" sibTransId="{1EC388C3-FBB4-430F-B4E3-6740F9F8DC3B}"/>
+    <dgm:cxn modelId="{AAB71410-0D40-4BA8-B987-91096240082A}" type="presOf" srcId="{3DD4D7DE-1347-4B4A-B334-31CE27C7A0AA}" destId="{3B9EA1D6-976C-4EB5-8C6A-983A6E2E6014}" srcOrd="1" destOrd="0" presId="urn:microsoft.com/office/officeart/2005/8/layout/hierarchy2"/>
     <dgm:cxn modelId="{1619CF14-A469-4404-9187-7AF289494CDB}" type="presOf" srcId="{82F995F7-8B15-4800-99B2-8CA5C46AD143}" destId="{B8B65ED0-A4BD-460E-B145-1E5083E7162F}" srcOrd="1" destOrd="0" presId="urn:microsoft.com/office/officeart/2005/8/layout/hierarchy2"/>
+    <dgm:cxn modelId="{035EA516-BA0D-4C09-882B-AA5187C3EEC0}" srcId="{157FC0CA-C77A-43A1-AABA-A8C24403CC6F}" destId="{19E77CD9-EE44-4C50-9A97-1A1CE80F1C0B}" srcOrd="1" destOrd="0" parTransId="{6B34733D-417E-4A88-B66A-5B055DCA04AB}" sibTransId="{446569A6-B739-48CD-88C8-8553333B0349}"/>
+    <dgm:cxn modelId="{94AF4C18-BDF5-4D21-A539-2A53D42068C1}" type="presOf" srcId="{066FCE7F-1D38-4D62-AF82-7270DB60F02C}" destId="{5610D7B2-34B4-49A3-B461-3B83E6A9038E}" srcOrd="0" destOrd="0" presId="urn:microsoft.com/office/officeart/2005/8/layout/hierarchy2"/>
+    <dgm:cxn modelId="{1688111C-FD7F-4956-9397-1AA86AFE1F7F}" srcId="{6FF187A9-047E-49EF-804F-56E9381F2335}" destId="{C7628974-0FC6-4E81-A619-A6A50727EB15}" srcOrd="1" destOrd="0" parTransId="{3DD4D7DE-1347-4B4A-B334-31CE27C7A0AA}" sibTransId="{BD89CC80-7B0C-4C21-8D13-C1323DA78BDE}"/>
+    <dgm:cxn modelId="{4908D41C-E417-4AD5-AAB6-098FE4A31279}" type="presOf" srcId="{B1688470-D2F6-4E4E-AAC8-D2A6ED0EDF29}" destId="{11292AF2-07BF-401D-A1C9-29192876F5FA}" srcOrd="0" destOrd="0" presId="urn:microsoft.com/office/officeart/2005/8/layout/hierarchy2"/>
     <dgm:cxn modelId="{F1CC841D-0428-4421-9D26-EFFB15C3B09C}" type="presOf" srcId="{EC1EA087-B360-4D89-AA27-D8E4FDAE10AB}" destId="{91AC95CC-15D9-46B3-96CB-7948BA1A22D8}" srcOrd="0" destOrd="0" presId="urn:microsoft.com/office/officeart/2005/8/layout/hierarchy2"/>
     <dgm:cxn modelId="{8FC82121-3A80-4462-AB7A-9BAC50F7D40E}" type="presOf" srcId="{48B96584-4BE4-488C-ACA0-5B00281287DA}" destId="{C34E3B4F-7CDC-4F33-ACE9-EF8E5B032D6A}" srcOrd="1" destOrd="0" presId="urn:microsoft.com/office/officeart/2005/8/layout/hierarchy2"/>
+    <dgm:cxn modelId="{9617CB22-0797-4E2A-919E-46CDF2E7CBE7}" type="presOf" srcId="{6B34733D-417E-4A88-B66A-5B055DCA04AB}" destId="{005094AE-2281-4CCB-A9CA-DEC88FD6BFB1}" srcOrd="1" destOrd="0" presId="urn:microsoft.com/office/officeart/2005/8/layout/hierarchy2"/>
+    <dgm:cxn modelId="{4C331423-1AF8-4E4E-9641-0E132BFE87B4}" type="presOf" srcId="{19E77CD9-EE44-4C50-9A97-1A1CE80F1C0B}" destId="{E14EF143-C782-4EB9-B89E-9B5C0E9EEA8B}" srcOrd="0" destOrd="0" presId="urn:microsoft.com/office/officeart/2005/8/layout/hierarchy2"/>
     <dgm:cxn modelId="{E5A69829-680B-42C3-97E6-0384FA8EA974}" type="presOf" srcId="{7B91CAB5-A40C-4C19-9064-E67FC2828E86}" destId="{B1EA40FE-4AA1-498B-A8EB-F7E2AB14DA3D}" srcOrd="0" destOrd="0" presId="urn:microsoft.com/office/officeart/2005/8/layout/hierarchy2"/>
     <dgm:cxn modelId="{5E9C7D2F-1A7F-4189-AE4E-E413D5734BD7}" type="presOf" srcId="{7988D76F-DC06-4919-9AE9-5315547E0C42}" destId="{C22B8A83-6861-4BFD-8688-0E9193EC4738}" srcOrd="1" destOrd="0" presId="urn:microsoft.com/office/officeart/2005/8/layout/hierarchy2"/>
+    <dgm:cxn modelId="{D7D7A631-46A0-4573-9D5B-E1EF3F719C9D}" type="presOf" srcId="{6B34733D-417E-4A88-B66A-5B055DCA04AB}" destId="{AAABA663-BDC6-4517-A47D-D7CF970A4EE5}" srcOrd="0" destOrd="0" presId="urn:microsoft.com/office/officeart/2005/8/layout/hierarchy2"/>
+    <dgm:cxn modelId="{9FE8A535-9082-439E-B8CA-9FC22EF5EDE1}" type="presOf" srcId="{6FF187A9-047E-49EF-804F-56E9381F2335}" destId="{4878B0CD-1E68-4E4F-B15A-8E8637FE59A3}" srcOrd="0" destOrd="0" presId="urn:microsoft.com/office/officeart/2005/8/layout/hierarchy2"/>
     <dgm:cxn modelId="{8876DE37-36A7-4E15-9BE0-F178A52A76CB}" srcId="{BBCAEBF3-E95D-4397-B63C-4F0D9311735E}" destId="{57D993C6-0F0F-4A3A-AAB4-B072F52E2560}" srcOrd="1" destOrd="0" parTransId="{7988D76F-DC06-4919-9AE9-5315547E0C42}" sibTransId="{BBA23BAE-407D-4A42-9078-EC42F2FAE739}"/>
     <dgm:cxn modelId="{3C8E4C3A-D77A-4284-98E6-6DCB5ABD8B0B}" type="presOf" srcId="{7988D76F-DC06-4919-9AE9-5315547E0C42}" destId="{A89F158F-7712-408E-945A-A4C00400EE0B}" srcOrd="0" destOrd="0" presId="urn:microsoft.com/office/officeart/2005/8/layout/hierarchy2"/>
+    <dgm:cxn modelId="{ABCE223D-D9AB-416C-8D4A-5C68C2AF597B}" type="presOf" srcId="{0380E99F-4F48-4306-B59F-7933FC5BC8C4}" destId="{D8FBD9FA-ADAE-444D-8602-A8A69D7BCAD6}" srcOrd="0" destOrd="0" presId="urn:microsoft.com/office/officeart/2005/8/layout/hierarchy2"/>
+    <dgm:cxn modelId="{ED41743E-A420-4FE4-8A39-2A11EE3029F7}" type="presOf" srcId="{3DD4D7DE-1347-4B4A-B334-31CE27C7A0AA}" destId="{40ED7B85-DA85-416F-AE28-F4DD8067B665}" srcOrd="0" destOrd="0" presId="urn:microsoft.com/office/officeart/2005/8/layout/hierarchy2"/>
+    <dgm:cxn modelId="{4B979461-DCD2-4237-85BC-99FB075550BD}" type="presOf" srcId="{56AA0889-DAD7-4038-B10B-7AC6A8294B79}" destId="{05210038-F275-4A49-9050-86DAC9D5F021}" srcOrd="0" destOrd="0" presId="urn:microsoft.com/office/officeart/2005/8/layout/hierarchy2"/>
     <dgm:cxn modelId="{E00DAA68-1898-453C-8673-D11C41435D32}" type="presOf" srcId="{F62B71B9-D782-45EE-B669-2EB26D7E1BC2}" destId="{A3A03251-E357-417C-9695-F2DD9C1AF2B3}" srcOrd="0" destOrd="0" presId="urn:microsoft.com/office/officeart/2005/8/layout/hierarchy2"/>
     <dgm:cxn modelId="{486FD54B-A374-4661-87B7-1CF363642896}" type="presOf" srcId="{82F995F7-8B15-4800-99B2-8CA5C46AD143}" destId="{534EB12E-C94A-4B97-B491-FA208C1013EE}" srcOrd="0" destOrd="0" presId="urn:microsoft.com/office/officeart/2005/8/layout/hierarchy2"/>
     <dgm:cxn modelId="{CF6B154F-E228-44E5-8F51-999397847ABA}" type="presOf" srcId="{A3C7F65C-04AF-485E-83F1-42BA7230AF4A}" destId="{309BFFE9-5CC3-49C0-A135-09BF0F757068}" srcOrd="0" destOrd="0" presId="urn:microsoft.com/office/officeart/2005/8/layout/hierarchy2"/>
     <dgm:cxn modelId="{0F97F74F-6CD1-4CEF-928E-FC29E66D46EE}" type="presOf" srcId="{157FC0CA-C77A-43A1-AABA-A8C24403CC6F}" destId="{59F49743-08FA-427E-9202-61D78109282F}" srcOrd="0" destOrd="0" presId="urn:microsoft.com/office/officeart/2005/8/layout/hierarchy2"/>
     <dgm:cxn modelId="{AEC21B50-1F38-460F-98BB-DA5A4ACCBD50}" srcId="{A3C7F65C-04AF-485E-83F1-42BA7230AF4A}" destId="{F62B71B9-D782-45EE-B669-2EB26D7E1BC2}" srcOrd="0" destOrd="0" parTransId="{395A6068-103C-42F9-B94B-1F62EAC3DB5A}" sibTransId="{961B012A-AC15-40B2-9FE4-D53A4BE5F78A}"/>
+    <dgm:cxn modelId="{AD235350-E37E-4C87-8C4D-7986B7880818}" type="presOf" srcId="{C7628974-0FC6-4E81-A619-A6A50727EB15}" destId="{0E2ACD24-4708-4A0E-B9DE-C3DAECC0A3EF}" srcOrd="0" destOrd="0" presId="urn:microsoft.com/office/officeart/2005/8/layout/hierarchy2"/>
     <dgm:cxn modelId="{3ABAFD73-99DA-4C09-A5C1-568BA95B47BA}" type="presOf" srcId="{7F815CBB-07DC-412F-8E27-050F57C62347}" destId="{0839EF7C-F436-4435-A481-3646916AD670}" srcOrd="0" destOrd="0" presId="urn:microsoft.com/office/officeart/2005/8/layout/hierarchy2"/>
-    <dgm:cxn modelId="{4B707B76-4631-4C34-981A-980D0A43E40D}" type="presOf" srcId="{B1688470-D2F6-4E4E-AAC8-D2A6ED0EDF29}" destId="{B7B4939C-3713-4C69-B512-6DE5750808CC}" srcOrd="1" destOrd="0" presId="urn:microsoft.com/office/officeart/2005/8/layout/hierarchy2"/>
-    <dgm:cxn modelId="{5FF62F58-7198-42DF-85AF-76514BDDAE05}" type="presOf" srcId="{B1688470-D2F6-4E4E-AAC8-D2A6ED0EDF29}" destId="{11292AF2-07BF-401D-A1C9-29192876F5FA}" srcOrd="0" destOrd="0" presId="urn:microsoft.com/office/officeart/2005/8/layout/hierarchy2"/>
+    <dgm:cxn modelId="{DACDC877-AEC1-4991-96C7-8D9202254AA9}" type="presOf" srcId="{E300B40C-0170-48F9-8B7B-D4D293C3F84E}" destId="{CA66C94B-5E4E-4030-A313-F8C85D4764F9}" srcOrd="1" destOrd="0" presId="urn:microsoft.com/office/officeart/2005/8/layout/hierarchy2"/>
     <dgm:cxn modelId="{DBEB387A-B7C0-40B8-929E-4C7E0A5B831E}" type="presOf" srcId="{48B96584-4BE4-488C-ACA0-5B00281287DA}" destId="{19BB2530-6D88-48D2-92C1-1B9E67C32339}" srcOrd="0" destOrd="0" presId="urn:microsoft.com/office/officeart/2005/8/layout/hierarchy2"/>
-    <dgm:cxn modelId="{C1E28C8E-25EB-4E34-BD93-02A38E4ACF76}" type="presOf" srcId="{6FF187A9-047E-49EF-804F-56E9381F2335}" destId="{4878B0CD-1E68-4E4F-B15A-8E8637FE59A3}" srcOrd="0" destOrd="0" presId="urn:microsoft.com/office/officeart/2005/8/layout/hierarchy2"/>
+    <dgm:cxn modelId="{E19CD785-3F24-402D-AB45-AE1BCBF388F6}" srcId="{6FF187A9-047E-49EF-804F-56E9381F2335}" destId="{56AA0889-DAD7-4038-B10B-7AC6A8294B79}" srcOrd="2" destOrd="0" parTransId="{E300B40C-0170-48F9-8B7B-D4D293C3F84E}" sibTransId="{3D29EA1F-0CF7-40BB-812C-E14830E47C71}"/>
     <dgm:cxn modelId="{1118E78E-50A4-4154-9136-6036BDE372AF}" srcId="{BBCAEBF3-E95D-4397-B63C-4F0D9311735E}" destId="{7B91CAB5-A40C-4C19-9064-E67FC2828E86}" srcOrd="0" destOrd="0" parTransId="{48B96584-4BE4-488C-ACA0-5B00281287DA}" sibTransId="{D8153872-50DF-4D19-B147-5DBFADD5DEC3}"/>
-    <dgm:cxn modelId="{8E9A8197-6898-436F-BAA4-5097FE291AEE}" srcId="{157FC0CA-C77A-43A1-AABA-A8C24403CC6F}" destId="{6FF187A9-047E-49EF-804F-56E9381F2335}" srcOrd="1" destOrd="0" parTransId="{B1688470-D2F6-4E4E-AAC8-D2A6ED0EDF29}" sibTransId="{8C7DAE97-BE0A-4640-A44C-4B0906E6BA61}"/>
+    <dgm:cxn modelId="{8E9A8197-6898-436F-BAA4-5097FE291AEE}" srcId="{F62B71B9-D782-45EE-B669-2EB26D7E1BC2}" destId="{6FF187A9-047E-49EF-804F-56E9381F2335}" srcOrd="2" destOrd="0" parTransId="{B1688470-D2F6-4E4E-AAC8-D2A6ED0EDF29}" sibTransId="{8C7DAE97-BE0A-4640-A44C-4B0906E6BA61}"/>
     <dgm:cxn modelId="{8D64AD9C-920C-4C4A-AD31-ADF5075130CB}" type="presOf" srcId="{444074BA-B5CA-412F-85AB-67AF292084F2}" destId="{CA718BED-4D9D-4130-9E7A-9E7D550BDEE7}" srcOrd="1" destOrd="0" presId="urn:microsoft.com/office/officeart/2005/8/layout/hierarchy2"/>
     <dgm:cxn modelId="{B0F0D89E-AFFB-4C63-BD64-0955B085FE2A}" srcId="{157FC0CA-C77A-43A1-AABA-A8C24403CC6F}" destId="{7F815CBB-07DC-412F-8E27-050F57C62347}" srcOrd="0" destOrd="0" parTransId="{82F995F7-8B15-4800-99B2-8CA5C46AD143}" sibTransId="{0D883D86-F34D-415D-B5A0-B9D0B9ECF4AC}"/>
+    <dgm:cxn modelId="{9E43C2A6-1024-4D29-B35E-3E1A141E388C}" type="presOf" srcId="{0380E99F-4F48-4306-B59F-7933FC5BC8C4}" destId="{E8FA6377-186D-41FA-882E-15D3D3767A94}" srcOrd="1" destOrd="0" presId="urn:microsoft.com/office/officeart/2005/8/layout/hierarchy2"/>
     <dgm:cxn modelId="{3678D2A7-8AD9-496E-A9EB-FCFA34DD45AF}" srcId="{F62B71B9-D782-45EE-B669-2EB26D7E1BC2}" destId="{157FC0CA-C77A-43A1-AABA-A8C24403CC6F}" srcOrd="1" destOrd="0" parTransId="{EC1EA087-B360-4D89-AA27-D8E4FDAE10AB}" sibTransId="{ECE3932A-B010-42A4-9AE0-6683C33F4F8D}"/>
+    <dgm:cxn modelId="{F320CFB1-AAC2-444C-AA22-74D8C4F0AABD}" type="presOf" srcId="{E300B40C-0170-48F9-8B7B-D4D293C3F84E}" destId="{FA38C550-A4E9-4E0C-A543-E976AFC6F9AC}" srcOrd="0" destOrd="0" presId="urn:microsoft.com/office/officeart/2005/8/layout/hierarchy2"/>
+    <dgm:cxn modelId="{A79D5ABA-C55F-40F5-A978-CE0C51288718}" type="presOf" srcId="{B1688470-D2F6-4E4E-AAC8-D2A6ED0EDF29}" destId="{B7B4939C-3713-4C69-B512-6DE5750808CC}" srcOrd="1" destOrd="0" presId="urn:microsoft.com/office/officeart/2005/8/layout/hierarchy2"/>
     <dgm:cxn modelId="{C2B3C2D4-EB9C-467A-B5EC-FA36E78F9BB0}" type="presOf" srcId="{EC1EA087-B360-4D89-AA27-D8E4FDAE10AB}" destId="{E03092BD-4C54-4927-9504-3D022EB93ED9}" srcOrd="1" destOrd="0" presId="urn:microsoft.com/office/officeart/2005/8/layout/hierarchy2"/>
     <dgm:cxn modelId="{DCB4EED4-A334-4E72-B09B-C412E08D6DA5}" type="presOf" srcId="{57D993C6-0F0F-4A3A-AAB4-B072F52E2560}" destId="{B84191BE-BDF4-49E2-AD70-0FE61855A97A}" srcOrd="0" destOrd="0" presId="urn:microsoft.com/office/officeart/2005/8/layout/hierarchy2"/>
+    <dgm:cxn modelId="{37DAD4D8-AF8A-40FE-BA02-2FA739712C94}" srcId="{6FF187A9-047E-49EF-804F-56E9381F2335}" destId="{066FCE7F-1D38-4D62-AF82-7270DB60F02C}" srcOrd="0" destOrd="0" parTransId="{0380E99F-4F48-4306-B59F-7933FC5BC8C4}" sibTransId="{5D4707FD-0CB9-4578-A9E4-EC35ACBCB3B0}"/>
     <dgm:cxn modelId="{91599FE5-0147-4223-85E9-48650526AD34}" type="presOf" srcId="{444074BA-B5CA-412F-85AB-67AF292084F2}" destId="{61D63F57-2DD9-428B-9252-452CC5289E2A}" srcOrd="0" destOrd="0" presId="urn:microsoft.com/office/officeart/2005/8/layout/hierarchy2"/>
     <dgm:cxn modelId="{62E189BD-A26C-4615-916E-BFECDACF0F44}" type="presParOf" srcId="{309BFFE9-5CC3-49C0-A135-09BF0F757068}" destId="{95CB2997-566E-4875-ACFC-137735418040}" srcOrd="0" destOrd="0" presId="urn:microsoft.com/office/officeart/2005/8/layout/hierarchy2"/>
     <dgm:cxn modelId="{518F1633-781B-4BCA-8A87-53343EE06D89}" type="presParOf" srcId="{95CB2997-566E-4875-ACFC-137735418040}" destId="{A3A03251-E357-417C-9695-F2DD9C1AF2B3}" srcOrd="0" destOrd="0" presId="urn:microsoft.com/office/officeart/2005/8/layout/hierarchy2"/>
@@ -1344,11 +1618,31 @@
     <dgm:cxn modelId="{1BA6ACEC-8E7E-4064-8787-792E6290D162}" type="presParOf" srcId="{1965CB10-4BED-4CFE-B207-0010DA2A9B71}" destId="{1133F70E-2842-4F51-87ED-9C2FFF6194E1}" srcOrd="1" destOrd="0" presId="urn:microsoft.com/office/officeart/2005/8/layout/hierarchy2"/>
     <dgm:cxn modelId="{0A253152-B6D8-461F-994A-9C97A0FEA5FA}" type="presParOf" srcId="{1133F70E-2842-4F51-87ED-9C2FFF6194E1}" destId="{0839EF7C-F436-4435-A481-3646916AD670}" srcOrd="0" destOrd="0" presId="urn:microsoft.com/office/officeart/2005/8/layout/hierarchy2"/>
     <dgm:cxn modelId="{F7575BD7-76B4-4CD5-A6B6-262295B43B27}" type="presParOf" srcId="{1133F70E-2842-4F51-87ED-9C2FFF6194E1}" destId="{F55C2058-031E-4AAE-9AFA-5D5532157BF1}" srcOrd="1" destOrd="0" presId="urn:microsoft.com/office/officeart/2005/8/layout/hierarchy2"/>
-    <dgm:cxn modelId="{634E21D4-7697-4DC5-8FA9-48EB7CE1D4B3}" type="presParOf" srcId="{1965CB10-4BED-4CFE-B207-0010DA2A9B71}" destId="{11292AF2-07BF-401D-A1C9-29192876F5FA}" srcOrd="2" destOrd="0" presId="urn:microsoft.com/office/officeart/2005/8/layout/hierarchy2"/>
-    <dgm:cxn modelId="{83A21ABD-33AC-47A4-89FA-BF4B8E315D47}" type="presParOf" srcId="{11292AF2-07BF-401D-A1C9-29192876F5FA}" destId="{B7B4939C-3713-4C69-B512-6DE5750808CC}" srcOrd="0" destOrd="0" presId="urn:microsoft.com/office/officeart/2005/8/layout/hierarchy2"/>
-    <dgm:cxn modelId="{C9213091-492C-4FFD-BDC9-39B47B8BBA7D}" type="presParOf" srcId="{1965CB10-4BED-4CFE-B207-0010DA2A9B71}" destId="{F8074C30-DA36-4042-B6B1-A64890963829}" srcOrd="3" destOrd="0" presId="urn:microsoft.com/office/officeart/2005/8/layout/hierarchy2"/>
-    <dgm:cxn modelId="{8A655721-17D1-4153-A532-314CEFAC53F1}" type="presParOf" srcId="{F8074C30-DA36-4042-B6B1-A64890963829}" destId="{4878B0CD-1E68-4E4F-B15A-8E8637FE59A3}" srcOrd="0" destOrd="0" presId="urn:microsoft.com/office/officeart/2005/8/layout/hierarchy2"/>
-    <dgm:cxn modelId="{3BE0872C-3411-4A23-B8C1-3E40FFDD4C9C}" type="presParOf" srcId="{F8074C30-DA36-4042-B6B1-A64890963829}" destId="{F1805EB4-9D93-4569-9B43-B2DA98F2F140}" srcOrd="1" destOrd="0" presId="urn:microsoft.com/office/officeart/2005/8/layout/hierarchy2"/>
+    <dgm:cxn modelId="{B076ADBC-D8FD-4827-9854-1A0F25E95AF1}" type="presParOf" srcId="{1965CB10-4BED-4CFE-B207-0010DA2A9B71}" destId="{AAABA663-BDC6-4517-A47D-D7CF970A4EE5}" srcOrd="2" destOrd="0" presId="urn:microsoft.com/office/officeart/2005/8/layout/hierarchy2"/>
+    <dgm:cxn modelId="{EA22772E-8381-4015-8463-925FEC6C219B}" type="presParOf" srcId="{AAABA663-BDC6-4517-A47D-D7CF970A4EE5}" destId="{005094AE-2281-4CCB-A9CA-DEC88FD6BFB1}" srcOrd="0" destOrd="0" presId="urn:microsoft.com/office/officeart/2005/8/layout/hierarchy2"/>
+    <dgm:cxn modelId="{60A257BE-ECC0-483F-9AEB-BBCB1E80500C}" type="presParOf" srcId="{1965CB10-4BED-4CFE-B207-0010DA2A9B71}" destId="{2E2EC87A-BA72-42E9-AC03-C3A199310BCC}" srcOrd="3" destOrd="0" presId="urn:microsoft.com/office/officeart/2005/8/layout/hierarchy2"/>
+    <dgm:cxn modelId="{AAF5C7BA-713D-4E64-9135-B2BCD5569B0C}" type="presParOf" srcId="{2E2EC87A-BA72-42E9-AC03-C3A199310BCC}" destId="{E14EF143-C782-4EB9-B89E-9B5C0E9EEA8B}" srcOrd="0" destOrd="0" presId="urn:microsoft.com/office/officeart/2005/8/layout/hierarchy2"/>
+    <dgm:cxn modelId="{E5C0678C-6995-490D-B2EB-80C910BC589B}" type="presParOf" srcId="{2E2EC87A-BA72-42E9-AC03-C3A199310BCC}" destId="{A12C22C4-47C2-41EF-A5E1-4C3903D1C91A}" srcOrd="1" destOrd="0" presId="urn:microsoft.com/office/officeart/2005/8/layout/hierarchy2"/>
+    <dgm:cxn modelId="{98D5143E-25F4-436E-8763-3E6E202C7AC8}" type="presParOf" srcId="{4ADE8A3D-9F8D-47A1-8FBA-3EA4D01B0706}" destId="{11292AF2-07BF-401D-A1C9-29192876F5FA}" srcOrd="4" destOrd="0" presId="urn:microsoft.com/office/officeart/2005/8/layout/hierarchy2"/>
+    <dgm:cxn modelId="{E681866B-B8E9-4FA1-AD5B-CEDE39B56BB8}" type="presParOf" srcId="{11292AF2-07BF-401D-A1C9-29192876F5FA}" destId="{B7B4939C-3713-4C69-B512-6DE5750808CC}" srcOrd="0" destOrd="0" presId="urn:microsoft.com/office/officeart/2005/8/layout/hierarchy2"/>
+    <dgm:cxn modelId="{F69406D5-B958-46A0-A764-8436E8138FF2}" type="presParOf" srcId="{4ADE8A3D-9F8D-47A1-8FBA-3EA4D01B0706}" destId="{F8074C30-DA36-4042-B6B1-A64890963829}" srcOrd="5" destOrd="0" presId="urn:microsoft.com/office/officeart/2005/8/layout/hierarchy2"/>
+    <dgm:cxn modelId="{7D19E97B-7C24-4F25-A49C-7EB8672488F3}" type="presParOf" srcId="{F8074C30-DA36-4042-B6B1-A64890963829}" destId="{4878B0CD-1E68-4E4F-B15A-8E8637FE59A3}" srcOrd="0" destOrd="0" presId="urn:microsoft.com/office/officeart/2005/8/layout/hierarchy2"/>
+    <dgm:cxn modelId="{4AD40311-BBFC-4890-8291-0B3001718460}" type="presParOf" srcId="{F8074C30-DA36-4042-B6B1-A64890963829}" destId="{F1805EB4-9D93-4569-9B43-B2DA98F2F140}" srcOrd="1" destOrd="0" presId="urn:microsoft.com/office/officeart/2005/8/layout/hierarchy2"/>
+    <dgm:cxn modelId="{6C97D2BE-F46C-42C5-A555-0E7F369A8DAC}" type="presParOf" srcId="{F1805EB4-9D93-4569-9B43-B2DA98F2F140}" destId="{D8FBD9FA-ADAE-444D-8602-A8A69D7BCAD6}" srcOrd="0" destOrd="0" presId="urn:microsoft.com/office/officeart/2005/8/layout/hierarchy2"/>
+    <dgm:cxn modelId="{5720CC05-65CD-41C1-9055-B521BC2E65BC}" type="presParOf" srcId="{D8FBD9FA-ADAE-444D-8602-A8A69D7BCAD6}" destId="{E8FA6377-186D-41FA-882E-15D3D3767A94}" srcOrd="0" destOrd="0" presId="urn:microsoft.com/office/officeart/2005/8/layout/hierarchy2"/>
+    <dgm:cxn modelId="{6F4FDEAD-F303-4C4A-8007-D893D87F9817}" type="presParOf" srcId="{F1805EB4-9D93-4569-9B43-B2DA98F2F140}" destId="{2205E13A-E989-42A8-9A82-54D06F3B3592}" srcOrd="1" destOrd="0" presId="urn:microsoft.com/office/officeart/2005/8/layout/hierarchy2"/>
+    <dgm:cxn modelId="{A13B00FA-3B10-47ED-B12D-A7574A13100D}" type="presParOf" srcId="{2205E13A-E989-42A8-9A82-54D06F3B3592}" destId="{5610D7B2-34B4-49A3-B461-3B83E6A9038E}" srcOrd="0" destOrd="0" presId="urn:microsoft.com/office/officeart/2005/8/layout/hierarchy2"/>
+    <dgm:cxn modelId="{64DA3A63-9962-4653-8768-4235D7EEBC65}" type="presParOf" srcId="{2205E13A-E989-42A8-9A82-54D06F3B3592}" destId="{8766A68E-A5C3-4990-A64A-89BDB01D279E}" srcOrd="1" destOrd="0" presId="urn:microsoft.com/office/officeart/2005/8/layout/hierarchy2"/>
+    <dgm:cxn modelId="{3F419DC2-2D0A-4897-A926-62E20125FFE5}" type="presParOf" srcId="{F1805EB4-9D93-4569-9B43-B2DA98F2F140}" destId="{40ED7B85-DA85-416F-AE28-F4DD8067B665}" srcOrd="2" destOrd="0" presId="urn:microsoft.com/office/officeart/2005/8/layout/hierarchy2"/>
+    <dgm:cxn modelId="{906DEB25-8590-4371-A11E-68DEEB0A4C4B}" type="presParOf" srcId="{40ED7B85-DA85-416F-AE28-F4DD8067B665}" destId="{3B9EA1D6-976C-4EB5-8C6A-983A6E2E6014}" srcOrd="0" destOrd="0" presId="urn:microsoft.com/office/officeart/2005/8/layout/hierarchy2"/>
+    <dgm:cxn modelId="{6C44F99E-AB6B-4231-A359-0BCE0C692B60}" type="presParOf" srcId="{F1805EB4-9D93-4569-9B43-B2DA98F2F140}" destId="{9F9402FB-270A-4A53-B1F6-53ACC775D7A1}" srcOrd="3" destOrd="0" presId="urn:microsoft.com/office/officeart/2005/8/layout/hierarchy2"/>
+    <dgm:cxn modelId="{653A6A4C-A9ED-43C5-BCD7-D6C5DB35D303}" type="presParOf" srcId="{9F9402FB-270A-4A53-B1F6-53ACC775D7A1}" destId="{0E2ACD24-4708-4A0E-B9DE-C3DAECC0A3EF}" srcOrd="0" destOrd="0" presId="urn:microsoft.com/office/officeart/2005/8/layout/hierarchy2"/>
+    <dgm:cxn modelId="{8D71A4DA-1475-487D-BD40-3B8625BEE633}" type="presParOf" srcId="{9F9402FB-270A-4A53-B1F6-53ACC775D7A1}" destId="{3F8EBD3A-F13A-4182-882B-4487B5C8DC30}" srcOrd="1" destOrd="0" presId="urn:microsoft.com/office/officeart/2005/8/layout/hierarchy2"/>
+    <dgm:cxn modelId="{2CF28129-2A23-4A42-B2F6-6A4798D37A9D}" type="presParOf" srcId="{F1805EB4-9D93-4569-9B43-B2DA98F2F140}" destId="{FA38C550-A4E9-4E0C-A543-E976AFC6F9AC}" srcOrd="4" destOrd="0" presId="urn:microsoft.com/office/officeart/2005/8/layout/hierarchy2"/>
+    <dgm:cxn modelId="{B1BE7753-FE9C-4F0A-A773-F273B05E58BF}" type="presParOf" srcId="{FA38C550-A4E9-4E0C-A543-E976AFC6F9AC}" destId="{CA66C94B-5E4E-4030-A313-F8C85D4764F9}" srcOrd="0" destOrd="0" presId="urn:microsoft.com/office/officeart/2005/8/layout/hierarchy2"/>
+    <dgm:cxn modelId="{07558287-0A6B-49B4-9B07-0EE02664B667}" type="presParOf" srcId="{F1805EB4-9D93-4569-9B43-B2DA98F2F140}" destId="{507BCDBC-2B4B-42C8-9D4D-79A3158901E4}" srcOrd="5" destOrd="0" presId="urn:microsoft.com/office/officeart/2005/8/layout/hierarchy2"/>
+    <dgm:cxn modelId="{86124A64-2E4F-47D9-ABEC-A4C676880834}" type="presParOf" srcId="{507BCDBC-2B4B-42C8-9D4D-79A3158901E4}" destId="{05210038-F275-4A49-9050-86DAC9D5F021}" srcOrd="0" destOrd="0" presId="urn:microsoft.com/office/officeart/2005/8/layout/hierarchy2"/>
+    <dgm:cxn modelId="{13757BBC-A8AF-453D-A12C-3A0EBC09135C}" type="presParOf" srcId="{507BCDBC-2B4B-42C8-9D4D-79A3158901E4}" destId="{585713D5-731B-4D21-975D-7A251D015714}" srcOrd="1" destOrd="0" presId="urn:microsoft.com/office/officeart/2005/8/layout/hierarchy2"/>
   </dgm:cxnLst>
   <dgm:bg/>
   <dgm:whole/>
@@ -1375,8 +1669,8 @@
       </dsp:nvSpPr>
       <dsp:spPr>
         <a:xfrm>
-          <a:off x="2116" y="2174875"/>
-          <a:ext cx="2137833" cy="1068916"/>
+          <a:off x="1459970" y="2169682"/>
+          <a:ext cx="1370541" cy="685270"/>
         </a:xfrm>
         <a:prstGeom prst="roundRect">
           <a:avLst>
@@ -1420,12 +1714,12 @@
         </a:fontRef>
       </dsp:style>
       <dsp:txBody>
-        <a:bodyPr spcFirstLastPara="0" vert="horz" wrap="square" lIns="13970" tIns="13970" rIns="13970" bIns="13970" numCol="1" spcCol="1270" anchor="ctr" anchorCtr="0">
+        <a:bodyPr spcFirstLastPara="0" vert="horz" wrap="square" lIns="8890" tIns="8890" rIns="8890" bIns="8890" numCol="1" spcCol="1270" anchor="ctr" anchorCtr="0">
           <a:noAutofit/>
         </a:bodyPr>
         <a:lstStyle/>
         <a:p>
-          <a:pPr marL="0" lvl="0" indent="0" algn="ctr" defTabSz="977900">
+          <a:pPr marL="0" lvl="0" indent="0" algn="ctr" defTabSz="622300">
             <a:lnSpc>
               <a:spcPct val="90000"/>
             </a:lnSpc>
@@ -1438,14 +1732,14 @@
             <a:buNone/>
           </a:pPr>
           <a:r>
-            <a:rPr lang="en-US" sz="2200" kern="1200" dirty="0"/>
+            <a:rPr lang="en-US" sz="1400" kern="1200" dirty="0"/>
             <a:t>Refugia value is high</a:t>
           </a:r>
         </a:p>
       </dsp:txBody>
       <dsp:txXfrm>
-        <a:off x="33423" y="2206182"/>
-        <a:ext cx="2075219" cy="1006302"/>
+        <a:off x="1480041" y="2189753"/>
+        <a:ext cx="1330399" cy="645128"/>
       </dsp:txXfrm>
     </dsp:sp>
     <dsp:sp modelId="{61D63F57-2DD9-428B-9252-452CC5289E2A}">
@@ -1454,9 +1748,9 @@
         <dsp:cNvSpPr/>
       </dsp:nvSpPr>
       <dsp:spPr>
-        <a:xfrm rot="18289469">
-          <a:off x="1818797" y="2076952"/>
-          <a:ext cx="1497437" cy="35507"/>
+        <a:xfrm rot="17230830">
+          <a:off x="2176644" y="1614367"/>
+          <a:ext cx="1855952" cy="22763"/>
         </a:xfrm>
         <a:custGeom>
           <a:avLst/>
@@ -1467,10 +1761,493 @@
           <a:pathLst>
             <a:path>
               <a:moveTo>
-                <a:pt x="0" y="17753"/>
+                <a:pt x="0" y="11381"/>
               </a:moveTo>
               <a:lnTo>
-                <a:pt x="1497437" y="17753"/>
+                <a:pt x="1855952" y="11381"/>
+              </a:lnTo>
+            </a:path>
+          </a:pathLst>
+        </a:custGeom>
+        <a:noFill/>
+        <a:ln w="12700" cap="flat" cmpd="sng" algn="ctr">
+          <a:solidFill>
+            <a:schemeClr val="accent1">
+              <a:shade val="60000"/>
+              <a:hueOff val="0"/>
+              <a:satOff val="0"/>
+              <a:lumOff val="0"/>
+              <a:alphaOff val="0"/>
+            </a:schemeClr>
+          </a:solidFill>
+          <a:prstDash val="solid"/>
+          <a:miter lim="800000"/>
+        </a:ln>
+        <a:effectLst/>
+      </dsp:spPr>
+      <dsp:style>
+        <a:lnRef idx="2">
+          <a:scrgbClr r="0" g="0" b="0"/>
+        </a:lnRef>
+        <a:fillRef idx="0">
+          <a:scrgbClr r="0" g="0" b="0"/>
+        </a:fillRef>
+        <a:effectRef idx="0">
+          <a:scrgbClr r="0" g="0" b="0"/>
+        </a:effectRef>
+        <a:fontRef idx="minor"/>
+      </dsp:style>
+      <dsp:txBody>
+        <a:bodyPr spcFirstLastPara="0" vert="horz" wrap="square" lIns="12700" tIns="0" rIns="12700" bIns="0" numCol="1" spcCol="1270" anchor="ctr" anchorCtr="0">
+          <a:noAutofit/>
+        </a:bodyPr>
+        <a:lstStyle/>
+        <a:p>
+          <a:pPr marL="0" lvl="0" indent="0" algn="ctr" defTabSz="266700">
+            <a:lnSpc>
+              <a:spcPct val="90000"/>
+            </a:lnSpc>
+            <a:spcBef>
+              <a:spcPct val="0"/>
+            </a:spcBef>
+            <a:spcAft>
+              <a:spcPct val="35000"/>
+            </a:spcAft>
+            <a:buNone/>
+          </a:pPr>
+          <a:endParaRPr lang="en-US" sz="600" kern="1200"/>
+        </a:p>
+      </dsp:txBody>
+      <dsp:txXfrm>
+        <a:off x="3058221" y="1579350"/>
+        <a:ext cx="92797" cy="92797"/>
+      </dsp:txXfrm>
+    </dsp:sp>
+    <dsp:sp modelId="{F555B95E-CE7C-4D14-BEB2-7DBD34640630}">
+      <dsp:nvSpPr>
+        <dsp:cNvPr id="0" name=""/>
+        <dsp:cNvSpPr/>
+      </dsp:nvSpPr>
+      <dsp:spPr>
+        <a:xfrm>
+          <a:off x="3378729" y="396544"/>
+          <a:ext cx="1370541" cy="685270"/>
+        </a:xfrm>
+        <a:prstGeom prst="roundRect">
+          <a:avLst>
+            <a:gd name="adj" fmla="val 10000"/>
+          </a:avLst>
+        </a:prstGeom>
+        <a:solidFill>
+          <a:schemeClr val="accent1">
+            <a:hueOff val="0"/>
+            <a:satOff val="0"/>
+            <a:lumOff val="0"/>
+            <a:alphaOff val="0"/>
+          </a:schemeClr>
+        </a:solidFill>
+        <a:ln w="12700" cap="flat" cmpd="sng" algn="ctr">
+          <a:solidFill>
+            <a:schemeClr val="lt1">
+              <a:hueOff val="0"/>
+              <a:satOff val="0"/>
+              <a:lumOff val="0"/>
+              <a:alphaOff val="0"/>
+            </a:schemeClr>
+          </a:solidFill>
+          <a:prstDash val="solid"/>
+          <a:miter lim="800000"/>
+        </a:ln>
+        <a:effectLst/>
+      </dsp:spPr>
+      <dsp:style>
+        <a:lnRef idx="2">
+          <a:scrgbClr r="0" g="0" b="0"/>
+        </a:lnRef>
+        <a:fillRef idx="1">
+          <a:scrgbClr r="0" g="0" b="0"/>
+        </a:fillRef>
+        <a:effectRef idx="0">
+          <a:scrgbClr r="0" g="0" b="0"/>
+        </a:effectRef>
+        <a:fontRef idx="minor">
+          <a:schemeClr val="lt1"/>
+        </a:fontRef>
+      </dsp:style>
+      <dsp:txBody>
+        <a:bodyPr spcFirstLastPara="0" vert="horz" wrap="square" lIns="8890" tIns="8890" rIns="8890" bIns="8890" numCol="1" spcCol="1270" anchor="ctr" anchorCtr="0">
+          <a:noAutofit/>
+        </a:bodyPr>
+        <a:lstStyle/>
+        <a:p>
+          <a:pPr marL="0" lvl="0" indent="0" algn="ctr" defTabSz="622300">
+            <a:lnSpc>
+              <a:spcPct val="90000"/>
+            </a:lnSpc>
+            <a:spcBef>
+              <a:spcPct val="0"/>
+            </a:spcBef>
+            <a:spcAft>
+              <a:spcPct val="35000"/>
+            </a:spcAft>
+            <a:buNone/>
+          </a:pPr>
+          <a:r>
+            <a:rPr lang="en-US" sz="1400" kern="1200" dirty="0"/>
+            <a:t>Infrastructure value is high</a:t>
+          </a:r>
+        </a:p>
+      </dsp:txBody>
+      <dsp:txXfrm>
+        <a:off x="3398800" y="416615"/>
+        <a:ext cx="1330399" cy="645128"/>
+      </dsp:txXfrm>
+    </dsp:sp>
+    <dsp:sp modelId="{19BB2530-6D88-48D2-92C1-1B9E67C32339}">
+      <dsp:nvSpPr>
+        <dsp:cNvPr id="0" name=""/>
+        <dsp:cNvSpPr/>
+      </dsp:nvSpPr>
+      <dsp:spPr>
+        <a:xfrm rot="19457599">
+          <a:off x="4685813" y="530782"/>
+          <a:ext cx="675130" cy="22763"/>
+        </a:xfrm>
+        <a:custGeom>
+          <a:avLst/>
+          <a:gdLst/>
+          <a:ahLst/>
+          <a:cxnLst/>
+          <a:rect l="0" t="0" r="0" b="0"/>
+          <a:pathLst>
+            <a:path>
+              <a:moveTo>
+                <a:pt x="0" y="11381"/>
+              </a:moveTo>
+              <a:lnTo>
+                <a:pt x="675130" y="11381"/>
+              </a:lnTo>
+            </a:path>
+          </a:pathLst>
+        </a:custGeom>
+        <a:noFill/>
+        <a:ln w="12700" cap="flat" cmpd="sng" algn="ctr">
+          <a:solidFill>
+            <a:schemeClr val="accent1">
+              <a:shade val="80000"/>
+              <a:hueOff val="0"/>
+              <a:satOff val="0"/>
+              <a:lumOff val="0"/>
+              <a:alphaOff val="0"/>
+            </a:schemeClr>
+          </a:solidFill>
+          <a:prstDash val="solid"/>
+          <a:miter lim="800000"/>
+        </a:ln>
+        <a:effectLst/>
+      </dsp:spPr>
+      <dsp:style>
+        <a:lnRef idx="2">
+          <a:scrgbClr r="0" g="0" b="0"/>
+        </a:lnRef>
+        <a:fillRef idx="0">
+          <a:scrgbClr r="0" g="0" b="0"/>
+        </a:fillRef>
+        <a:effectRef idx="0">
+          <a:scrgbClr r="0" g="0" b="0"/>
+        </a:effectRef>
+        <a:fontRef idx="minor"/>
+      </dsp:style>
+      <dsp:txBody>
+        <a:bodyPr spcFirstLastPara="0" vert="horz" wrap="square" lIns="12700" tIns="0" rIns="12700" bIns="0" numCol="1" spcCol="1270" anchor="ctr" anchorCtr="0">
+          <a:noAutofit/>
+        </a:bodyPr>
+        <a:lstStyle/>
+        <a:p>
+          <a:pPr marL="0" lvl="0" indent="0" algn="ctr" defTabSz="222250">
+            <a:lnSpc>
+              <a:spcPct val="90000"/>
+            </a:lnSpc>
+            <a:spcBef>
+              <a:spcPct val="0"/>
+            </a:spcBef>
+            <a:spcAft>
+              <a:spcPct val="35000"/>
+            </a:spcAft>
+            <a:buNone/>
+          </a:pPr>
+          <a:endParaRPr lang="en-US" sz="500" kern="1200"/>
+        </a:p>
+      </dsp:txBody>
+      <dsp:txXfrm>
+        <a:off x="5006500" y="525286"/>
+        <a:ext cx="33756" cy="33756"/>
+      </dsp:txXfrm>
+    </dsp:sp>
+    <dsp:sp modelId="{B1EA40FE-4AA1-498B-A8EB-F7E2AB14DA3D}">
+      <dsp:nvSpPr>
+        <dsp:cNvPr id="0" name=""/>
+        <dsp:cNvSpPr/>
+      </dsp:nvSpPr>
+      <dsp:spPr>
+        <a:xfrm>
+          <a:off x="5297487" y="2513"/>
+          <a:ext cx="1370541" cy="685270"/>
+        </a:xfrm>
+        <a:prstGeom prst="roundRect">
+          <a:avLst>
+            <a:gd name="adj" fmla="val 10000"/>
+          </a:avLst>
+        </a:prstGeom>
+        <a:solidFill>
+          <a:schemeClr val="accent1">
+            <a:hueOff val="0"/>
+            <a:satOff val="0"/>
+            <a:lumOff val="0"/>
+            <a:alphaOff val="0"/>
+          </a:schemeClr>
+        </a:solidFill>
+        <a:ln w="12700" cap="flat" cmpd="sng" algn="ctr">
+          <a:solidFill>
+            <a:schemeClr val="lt1">
+              <a:hueOff val="0"/>
+              <a:satOff val="0"/>
+              <a:lumOff val="0"/>
+              <a:alphaOff val="0"/>
+            </a:schemeClr>
+          </a:solidFill>
+          <a:prstDash val="solid"/>
+          <a:miter lim="800000"/>
+        </a:ln>
+        <a:effectLst/>
+      </dsp:spPr>
+      <dsp:style>
+        <a:lnRef idx="2">
+          <a:scrgbClr r="0" g="0" b="0"/>
+        </a:lnRef>
+        <a:fillRef idx="1">
+          <a:scrgbClr r="0" g="0" b="0"/>
+        </a:fillRef>
+        <a:effectRef idx="0">
+          <a:scrgbClr r="0" g="0" b="0"/>
+        </a:effectRef>
+        <a:fontRef idx="minor">
+          <a:schemeClr val="lt1"/>
+        </a:fontRef>
+      </dsp:style>
+      <dsp:txBody>
+        <a:bodyPr spcFirstLastPara="0" vert="horz" wrap="square" lIns="8890" tIns="8890" rIns="8890" bIns="8890" numCol="1" spcCol="1270" anchor="ctr" anchorCtr="0">
+          <a:noAutofit/>
+        </a:bodyPr>
+        <a:lstStyle/>
+        <a:p>
+          <a:pPr marL="0" lvl="0" indent="0" algn="ctr" defTabSz="622300">
+            <a:lnSpc>
+              <a:spcPct val="90000"/>
+            </a:lnSpc>
+            <a:spcBef>
+              <a:spcPct val="0"/>
+            </a:spcBef>
+            <a:spcAft>
+              <a:spcPct val="35000"/>
+            </a:spcAft>
+            <a:buNone/>
+          </a:pPr>
+          <a:r>
+            <a:rPr lang="en-US" sz="1400" kern="1200" dirty="0"/>
+            <a:t>Number of buildings is high</a:t>
+          </a:r>
+        </a:p>
+      </dsp:txBody>
+      <dsp:txXfrm>
+        <a:off x="5317558" y="22584"/>
+        <a:ext cx="1330399" cy="645128"/>
+      </dsp:txXfrm>
+    </dsp:sp>
+    <dsp:sp modelId="{A89F158F-7712-408E-945A-A4C00400EE0B}">
+      <dsp:nvSpPr>
+        <dsp:cNvPr id="0" name=""/>
+        <dsp:cNvSpPr/>
+      </dsp:nvSpPr>
+      <dsp:spPr>
+        <a:xfrm rot="2142401">
+          <a:off x="4685813" y="924813"/>
+          <a:ext cx="675130" cy="22763"/>
+        </a:xfrm>
+        <a:custGeom>
+          <a:avLst/>
+          <a:gdLst/>
+          <a:ahLst/>
+          <a:cxnLst/>
+          <a:rect l="0" t="0" r="0" b="0"/>
+          <a:pathLst>
+            <a:path>
+              <a:moveTo>
+                <a:pt x="0" y="11381"/>
+              </a:moveTo>
+              <a:lnTo>
+                <a:pt x="675130" y="11381"/>
+              </a:lnTo>
+            </a:path>
+          </a:pathLst>
+        </a:custGeom>
+        <a:noFill/>
+        <a:ln w="12700" cap="flat" cmpd="sng" algn="ctr">
+          <a:solidFill>
+            <a:schemeClr val="accent1">
+              <a:shade val="80000"/>
+              <a:hueOff val="0"/>
+              <a:satOff val="0"/>
+              <a:lumOff val="0"/>
+              <a:alphaOff val="0"/>
+            </a:schemeClr>
+          </a:solidFill>
+          <a:prstDash val="solid"/>
+          <a:miter lim="800000"/>
+        </a:ln>
+        <a:effectLst/>
+      </dsp:spPr>
+      <dsp:style>
+        <a:lnRef idx="2">
+          <a:scrgbClr r="0" g="0" b="0"/>
+        </a:lnRef>
+        <a:fillRef idx="0">
+          <a:scrgbClr r="0" g="0" b="0"/>
+        </a:fillRef>
+        <a:effectRef idx="0">
+          <a:scrgbClr r="0" g="0" b="0"/>
+        </a:effectRef>
+        <a:fontRef idx="minor"/>
+      </dsp:style>
+      <dsp:txBody>
+        <a:bodyPr spcFirstLastPara="0" vert="horz" wrap="square" lIns="12700" tIns="0" rIns="12700" bIns="0" numCol="1" spcCol="1270" anchor="ctr" anchorCtr="0">
+          <a:noAutofit/>
+        </a:bodyPr>
+        <a:lstStyle/>
+        <a:p>
+          <a:pPr marL="0" lvl="0" indent="0" algn="ctr" defTabSz="222250">
+            <a:lnSpc>
+              <a:spcPct val="90000"/>
+            </a:lnSpc>
+            <a:spcBef>
+              <a:spcPct val="0"/>
+            </a:spcBef>
+            <a:spcAft>
+              <a:spcPct val="35000"/>
+            </a:spcAft>
+            <a:buNone/>
+          </a:pPr>
+          <a:endParaRPr lang="en-US" sz="500" kern="1200"/>
+        </a:p>
+      </dsp:txBody>
+      <dsp:txXfrm>
+        <a:off x="5006500" y="919316"/>
+        <a:ext cx="33756" cy="33756"/>
+      </dsp:txXfrm>
+    </dsp:sp>
+    <dsp:sp modelId="{B84191BE-BDF4-49E2-AD70-0FE61855A97A}">
+      <dsp:nvSpPr>
+        <dsp:cNvPr id="0" name=""/>
+        <dsp:cNvSpPr/>
+      </dsp:nvSpPr>
+      <dsp:spPr>
+        <a:xfrm>
+          <a:off x="5297487" y="790575"/>
+          <a:ext cx="1370541" cy="685270"/>
+        </a:xfrm>
+        <a:prstGeom prst="roundRect">
+          <a:avLst>
+            <a:gd name="adj" fmla="val 10000"/>
+          </a:avLst>
+        </a:prstGeom>
+        <a:solidFill>
+          <a:schemeClr val="accent1">
+            <a:hueOff val="0"/>
+            <a:satOff val="0"/>
+            <a:lumOff val="0"/>
+            <a:alphaOff val="0"/>
+          </a:schemeClr>
+        </a:solidFill>
+        <a:ln w="12700" cap="flat" cmpd="sng" algn="ctr">
+          <a:solidFill>
+            <a:schemeClr val="lt1">
+              <a:hueOff val="0"/>
+              <a:satOff val="0"/>
+              <a:lumOff val="0"/>
+              <a:alphaOff val="0"/>
+            </a:schemeClr>
+          </a:solidFill>
+          <a:prstDash val="solid"/>
+          <a:miter lim="800000"/>
+        </a:ln>
+        <a:effectLst/>
+      </dsp:spPr>
+      <dsp:style>
+        <a:lnRef idx="2">
+          <a:scrgbClr r="0" g="0" b="0"/>
+        </a:lnRef>
+        <a:fillRef idx="1">
+          <a:scrgbClr r="0" g="0" b="0"/>
+        </a:fillRef>
+        <a:effectRef idx="0">
+          <a:scrgbClr r="0" g="0" b="0"/>
+        </a:effectRef>
+        <a:fontRef idx="minor">
+          <a:schemeClr val="lt1"/>
+        </a:fontRef>
+      </dsp:style>
+      <dsp:txBody>
+        <a:bodyPr spcFirstLastPara="0" vert="horz" wrap="square" lIns="8890" tIns="8890" rIns="8890" bIns="8890" numCol="1" spcCol="1270" anchor="ctr" anchorCtr="0">
+          <a:noAutofit/>
+        </a:bodyPr>
+        <a:lstStyle/>
+        <a:p>
+          <a:pPr marL="0" lvl="0" indent="0" algn="ctr" defTabSz="622300">
+            <a:lnSpc>
+              <a:spcPct val="90000"/>
+            </a:lnSpc>
+            <a:spcBef>
+              <a:spcPct val="0"/>
+            </a:spcBef>
+            <a:spcAft>
+              <a:spcPct val="35000"/>
+            </a:spcAft>
+            <a:buNone/>
+          </a:pPr>
+          <a:r>
+            <a:rPr lang="en-US" sz="1400" kern="1200" dirty="0"/>
+            <a:t>Number or comm. towers is high</a:t>
+          </a:r>
+        </a:p>
+      </dsp:txBody>
+      <dsp:txXfrm>
+        <a:off x="5317558" y="810646"/>
+        <a:ext cx="1330399" cy="645128"/>
+      </dsp:txXfrm>
+    </dsp:sp>
+    <dsp:sp modelId="{91AC95CC-15D9-46B3-96CB-7948BA1A22D8}">
+      <dsp:nvSpPr>
+        <dsp:cNvPr id="0" name=""/>
+        <dsp:cNvSpPr/>
+      </dsp:nvSpPr>
+      <dsp:spPr>
+        <a:xfrm rot="20413970">
+          <a:off x="2813349" y="2402428"/>
+          <a:ext cx="582543" cy="22763"/>
+        </a:xfrm>
+        <a:custGeom>
+          <a:avLst/>
+          <a:gdLst/>
+          <a:ahLst/>
+          <a:cxnLst/>
+          <a:rect l="0" t="0" r="0" b="0"/>
+          <a:pathLst>
+            <a:path>
+              <a:moveTo>
+                <a:pt x="0" y="11381"/>
+              </a:moveTo>
+              <a:lnTo>
+                <a:pt x="582543" y="11381"/>
               </a:lnTo>
             </a:path>
           </a:pathLst>
@@ -1525,19 +2302,19 @@
         </a:p>
       </dsp:txBody>
       <dsp:txXfrm>
-        <a:off x="2530080" y="2057270"/>
-        <a:ext cx="74871" cy="74871"/>
+        <a:off x="3090057" y="2399246"/>
+        <a:ext cx="29127" cy="29127"/>
       </dsp:txXfrm>
     </dsp:sp>
-    <dsp:sp modelId="{F555B95E-CE7C-4D14-BEB2-7DBD34640630}">
+    <dsp:sp modelId="{59F49743-08FA-427E-9202-61D78109282F}">
       <dsp:nvSpPr>
         <dsp:cNvPr id="0" name=""/>
         <dsp:cNvSpPr/>
       </dsp:nvSpPr>
       <dsp:spPr>
         <a:xfrm>
-          <a:off x="2995083" y="945620"/>
-          <a:ext cx="2137833" cy="1068916"/>
+          <a:off x="3378729" y="1972667"/>
+          <a:ext cx="1370541" cy="685270"/>
         </a:xfrm>
         <a:prstGeom prst="roundRect">
           <a:avLst>
@@ -1581,12 +2358,12 @@
         </a:fontRef>
       </dsp:style>
       <dsp:txBody>
-        <a:bodyPr spcFirstLastPara="0" vert="horz" wrap="square" lIns="13970" tIns="13970" rIns="13970" bIns="13970" numCol="1" spcCol="1270" anchor="ctr" anchorCtr="0">
+        <a:bodyPr spcFirstLastPara="0" vert="horz" wrap="square" lIns="8890" tIns="8890" rIns="8890" bIns="8890" numCol="1" spcCol="1270" anchor="ctr" anchorCtr="0">
           <a:noAutofit/>
         </a:bodyPr>
         <a:lstStyle/>
         <a:p>
-          <a:pPr marL="0" lvl="0" indent="0" algn="ctr" defTabSz="977900">
+          <a:pPr marL="0" lvl="0" indent="0" algn="ctr" defTabSz="622300">
             <a:lnSpc>
               <a:spcPct val="90000"/>
             </a:lnSpc>
@@ -1599,25 +2376,25 @@
             <a:buNone/>
           </a:pPr>
           <a:r>
-            <a:rPr lang="en-US" sz="2200" kern="1200" dirty="0"/>
-            <a:t>Infrastructure value is high</a:t>
+            <a:rPr lang="en-US" sz="1400" kern="1200" dirty="0"/>
+            <a:t>Habitat value is high</a:t>
           </a:r>
         </a:p>
       </dsp:txBody>
       <dsp:txXfrm>
-        <a:off x="3026390" y="976927"/>
-        <a:ext cx="2075219" cy="1006302"/>
+        <a:off x="3398800" y="1992738"/>
+        <a:ext cx="1330399" cy="645128"/>
       </dsp:txXfrm>
     </dsp:sp>
-    <dsp:sp modelId="{19BB2530-6D88-48D2-92C1-1B9E67C32339}">
+    <dsp:sp modelId="{534EB12E-C94A-4B97-B491-FA208C1013EE}">
       <dsp:nvSpPr>
         <dsp:cNvPr id="0" name=""/>
         <dsp:cNvSpPr/>
       </dsp:nvSpPr>
       <dsp:spPr>
         <a:xfrm rot="19457599">
-          <a:off x="5033933" y="1155011"/>
-          <a:ext cx="1053099" cy="35507"/>
+          <a:off x="4685813" y="2106905"/>
+          <a:ext cx="675130" cy="22763"/>
         </a:xfrm>
         <a:custGeom>
           <a:avLst/>
@@ -1628,10 +2405,10 @@
           <a:pathLst>
             <a:path>
               <a:moveTo>
-                <a:pt x="0" y="17753"/>
+                <a:pt x="0" y="11381"/>
               </a:moveTo>
               <a:lnTo>
-                <a:pt x="1053099" y="17753"/>
+                <a:pt x="675130" y="11381"/>
               </a:lnTo>
             </a:path>
           </a:pathLst>
@@ -1686,19 +2463,19 @@
         </a:p>
       </dsp:txBody>
       <dsp:txXfrm>
-        <a:off x="5534155" y="1146438"/>
-        <a:ext cx="52654" cy="52654"/>
+        <a:off x="5006500" y="2101409"/>
+        <a:ext cx="33756" cy="33756"/>
       </dsp:txXfrm>
     </dsp:sp>
-    <dsp:sp modelId="{B1EA40FE-4AA1-498B-A8EB-F7E2AB14DA3D}">
+    <dsp:sp modelId="{0839EF7C-F436-4435-A481-3646916AD670}">
       <dsp:nvSpPr>
         <dsp:cNvPr id="0" name=""/>
         <dsp:cNvSpPr/>
       </dsp:nvSpPr>
       <dsp:spPr>
         <a:xfrm>
-          <a:off x="5988050" y="330993"/>
-          <a:ext cx="2137833" cy="1068916"/>
+          <a:off x="5297487" y="1578636"/>
+          <a:ext cx="1370541" cy="685270"/>
         </a:xfrm>
         <a:prstGeom prst="roundRect">
           <a:avLst>
@@ -1742,12 +2519,12 @@
         </a:fontRef>
       </dsp:style>
       <dsp:txBody>
-        <a:bodyPr spcFirstLastPara="0" vert="horz" wrap="square" lIns="13970" tIns="13970" rIns="13970" bIns="13970" numCol="1" spcCol="1270" anchor="ctr" anchorCtr="0">
+        <a:bodyPr spcFirstLastPara="0" vert="horz" wrap="square" lIns="8890" tIns="8890" rIns="8890" bIns="8890" numCol="1" spcCol="1270" anchor="ctr" anchorCtr="0">
           <a:noAutofit/>
         </a:bodyPr>
         <a:lstStyle/>
         <a:p>
-          <a:pPr marL="0" lvl="0" indent="0" algn="ctr" defTabSz="977900">
+          <a:pPr marL="0" lvl="0" indent="0" algn="ctr" defTabSz="622300">
             <a:lnSpc>
               <a:spcPct val="90000"/>
             </a:lnSpc>
@@ -1760,25 +2537,25 @@
             <a:buNone/>
           </a:pPr>
           <a:r>
-            <a:rPr lang="en-US" sz="2200" kern="1200" dirty="0"/>
-            <a:t>Number of buildings is high</a:t>
+            <a:rPr lang="en-US" sz="1400" kern="1200" dirty="0"/>
+            <a:t>Habitat for important species is present</a:t>
           </a:r>
         </a:p>
       </dsp:txBody>
       <dsp:txXfrm>
-        <a:off x="6019357" y="362300"/>
-        <a:ext cx="2075219" cy="1006302"/>
+        <a:off x="5317558" y="1598707"/>
+        <a:ext cx="1330399" cy="645128"/>
       </dsp:txXfrm>
     </dsp:sp>
-    <dsp:sp modelId="{A89F158F-7712-408E-945A-A4C00400EE0B}">
+    <dsp:sp modelId="{AAABA663-BDC6-4517-A47D-D7CF970A4EE5}">
       <dsp:nvSpPr>
         <dsp:cNvPr id="0" name=""/>
         <dsp:cNvSpPr/>
       </dsp:nvSpPr>
       <dsp:spPr>
         <a:xfrm rot="2142401">
-          <a:off x="5033933" y="1769638"/>
-          <a:ext cx="1053099" cy="35507"/>
+          <a:off x="4685813" y="2500936"/>
+          <a:ext cx="675130" cy="22763"/>
         </a:xfrm>
         <a:custGeom>
           <a:avLst/>
@@ -1789,10 +2566,10 @@
           <a:pathLst>
             <a:path>
               <a:moveTo>
-                <a:pt x="0" y="17753"/>
+                <a:pt x="0" y="11381"/>
               </a:moveTo>
               <a:lnTo>
-                <a:pt x="1053099" y="17753"/>
+                <a:pt x="675130" y="11381"/>
               </a:lnTo>
             </a:path>
           </a:pathLst>
@@ -1847,19 +2624,19 @@
         </a:p>
       </dsp:txBody>
       <dsp:txXfrm>
-        <a:off x="5534155" y="1761065"/>
-        <a:ext cx="52654" cy="52654"/>
+        <a:off x="5006500" y="2495439"/>
+        <a:ext cx="33756" cy="33756"/>
       </dsp:txXfrm>
     </dsp:sp>
-    <dsp:sp modelId="{B84191BE-BDF4-49E2-AD70-0FE61855A97A}">
+    <dsp:sp modelId="{E14EF143-C782-4EB9-B89E-9B5C0E9EEA8B}">
       <dsp:nvSpPr>
         <dsp:cNvPr id="0" name=""/>
         <dsp:cNvSpPr/>
       </dsp:nvSpPr>
       <dsp:spPr>
         <a:xfrm>
-          <a:off x="5988050" y="1560248"/>
-          <a:ext cx="2137833" cy="1068916"/>
+          <a:off x="5297487" y="2366698"/>
+          <a:ext cx="1370541" cy="685270"/>
         </a:xfrm>
         <a:prstGeom prst="roundRect">
           <a:avLst>
@@ -1903,12 +2680,12 @@
         </a:fontRef>
       </dsp:style>
       <dsp:txBody>
-        <a:bodyPr spcFirstLastPara="0" vert="horz" wrap="square" lIns="13970" tIns="13970" rIns="13970" bIns="13970" numCol="1" spcCol="1270" anchor="ctr" anchorCtr="0">
+        <a:bodyPr spcFirstLastPara="0" vert="horz" wrap="square" lIns="8890" tIns="8890" rIns="8890" bIns="8890" numCol="1" spcCol="1270" anchor="ctr" anchorCtr="0">
           <a:noAutofit/>
         </a:bodyPr>
         <a:lstStyle/>
         <a:p>
-          <a:pPr marL="0" lvl="0" indent="0" algn="ctr" defTabSz="977900">
+          <a:pPr marL="0" lvl="0" indent="0" algn="ctr" defTabSz="622300">
             <a:lnSpc>
               <a:spcPct val="90000"/>
             </a:lnSpc>
@@ -1921,25 +2698,25 @@
             <a:buNone/>
           </a:pPr>
           <a:r>
-            <a:rPr lang="en-US" sz="2200" kern="1200" dirty="0"/>
-            <a:t>Number or comm. towers is high</a:t>
+            <a:rPr lang="en-US" sz="1400" kern="1200" dirty="0"/>
+            <a:t>Invasive species cover is low</a:t>
           </a:r>
         </a:p>
       </dsp:txBody>
       <dsp:txXfrm>
-        <a:off x="6019357" y="1591555"/>
-        <a:ext cx="2075219" cy="1006302"/>
+        <a:off x="5317558" y="2386769"/>
+        <a:ext cx="1330399" cy="645128"/>
       </dsp:txXfrm>
     </dsp:sp>
-    <dsp:sp modelId="{91AC95CC-15D9-46B3-96CB-7948BA1A22D8}">
+    <dsp:sp modelId="{11292AF2-07BF-401D-A1C9-29192876F5FA}">
       <dsp:nvSpPr>
         <dsp:cNvPr id="0" name=""/>
         <dsp:cNvSpPr/>
       </dsp:nvSpPr>
       <dsp:spPr>
-        <a:xfrm rot="3310531">
-          <a:off x="1818797" y="3306206"/>
-          <a:ext cx="1497437" cy="35507"/>
+        <a:xfrm rot="4369170">
+          <a:off x="2176644" y="3387505"/>
+          <a:ext cx="1855952" cy="22763"/>
         </a:xfrm>
         <a:custGeom>
           <a:avLst/>
@@ -1950,10 +2727,10 @@
           <a:pathLst>
             <a:path>
               <a:moveTo>
-                <a:pt x="0" y="17753"/>
+                <a:pt x="0" y="11381"/>
               </a:moveTo>
               <a:lnTo>
-                <a:pt x="1497437" y="17753"/>
+                <a:pt x="1855952" y="11381"/>
               </a:lnTo>
             </a:path>
           </a:pathLst>
@@ -1992,7 +2769,7 @@
         </a:bodyPr>
         <a:lstStyle/>
         <a:p>
-          <a:pPr marL="0" lvl="0" indent="0" algn="ctr" defTabSz="222250">
+          <a:pPr marL="0" lvl="0" indent="0" algn="ctr" defTabSz="266700">
             <a:lnSpc>
               <a:spcPct val="90000"/>
             </a:lnSpc>
@@ -2004,23 +2781,23 @@
             </a:spcAft>
             <a:buNone/>
           </a:pPr>
-          <a:endParaRPr lang="en-US" sz="500" kern="1200"/>
+          <a:endParaRPr lang="en-US" sz="600" kern="1200"/>
         </a:p>
       </dsp:txBody>
       <dsp:txXfrm>
-        <a:off x="2530080" y="3286524"/>
-        <a:ext cx="74871" cy="74871"/>
+        <a:off x="3058221" y="3352488"/>
+        <a:ext cx="92797" cy="92797"/>
       </dsp:txXfrm>
     </dsp:sp>
-    <dsp:sp modelId="{59F49743-08FA-427E-9202-61D78109282F}">
+    <dsp:sp modelId="{4878B0CD-1E68-4E4F-B15A-8E8637FE59A3}">
       <dsp:nvSpPr>
         <dsp:cNvPr id="0" name=""/>
         <dsp:cNvSpPr/>
       </dsp:nvSpPr>
       <dsp:spPr>
         <a:xfrm>
-          <a:off x="2995083" y="3404129"/>
-          <a:ext cx="2137833" cy="1068916"/>
+          <a:off x="3378729" y="3942821"/>
+          <a:ext cx="1370541" cy="685270"/>
         </a:xfrm>
         <a:prstGeom prst="roundRect">
           <a:avLst>
@@ -2064,12 +2841,12 @@
         </a:fontRef>
       </dsp:style>
       <dsp:txBody>
-        <a:bodyPr spcFirstLastPara="0" vert="horz" wrap="square" lIns="13970" tIns="13970" rIns="13970" bIns="13970" numCol="1" spcCol="1270" anchor="ctr" anchorCtr="0">
+        <a:bodyPr spcFirstLastPara="0" vert="horz" wrap="square" lIns="8890" tIns="8890" rIns="8890" bIns="8890" numCol="1" spcCol="1270" anchor="ctr" anchorCtr="0">
           <a:noAutofit/>
         </a:bodyPr>
         <a:lstStyle/>
         <a:p>
-          <a:pPr marL="0" lvl="0" indent="0" algn="ctr" defTabSz="977900">
+          <a:pPr marL="0" lvl="0" indent="0" algn="ctr" defTabSz="622300">
             <a:lnSpc>
               <a:spcPct val="90000"/>
             </a:lnSpc>
@@ -2082,25 +2859,25 @@
             <a:buNone/>
           </a:pPr>
           <a:r>
-            <a:rPr lang="en-US" sz="2200" kern="1200" dirty="0"/>
-            <a:t>Habitat quality is high</a:t>
+            <a:rPr lang="en-US" sz="1400" kern="1200" dirty="0"/>
+            <a:t>Uniqueness is high</a:t>
           </a:r>
         </a:p>
       </dsp:txBody>
       <dsp:txXfrm>
-        <a:off x="3026390" y="3435436"/>
-        <a:ext cx="2075219" cy="1006302"/>
+        <a:off x="3398800" y="3962892"/>
+        <a:ext cx="1330399" cy="645128"/>
       </dsp:txXfrm>
     </dsp:sp>
-    <dsp:sp modelId="{534EB12E-C94A-4B97-B491-FA208C1013EE}">
+    <dsp:sp modelId="{D8FBD9FA-ADAE-444D-8602-A8A69D7BCAD6}">
       <dsp:nvSpPr>
         <dsp:cNvPr id="0" name=""/>
         <dsp:cNvSpPr/>
       </dsp:nvSpPr>
       <dsp:spPr>
-        <a:xfrm rot="19457599">
-          <a:off x="5033933" y="3613520"/>
-          <a:ext cx="1053099" cy="35507"/>
+        <a:xfrm rot="18289469">
+          <a:off x="4543383" y="3880043"/>
+          <a:ext cx="959990" cy="22763"/>
         </a:xfrm>
         <a:custGeom>
           <a:avLst/>
@@ -2111,10 +2888,10 @@
           <a:pathLst>
             <a:path>
               <a:moveTo>
-                <a:pt x="0" y="17753"/>
+                <a:pt x="0" y="11381"/>
               </a:moveTo>
               <a:lnTo>
-                <a:pt x="1053099" y="17753"/>
+                <a:pt x="959990" y="11381"/>
               </a:lnTo>
             </a:path>
           </a:pathLst>
@@ -2169,19 +2946,19 @@
         </a:p>
       </dsp:txBody>
       <dsp:txXfrm>
-        <a:off x="5534155" y="3604946"/>
-        <a:ext cx="52654" cy="52654"/>
+        <a:off x="4999379" y="3867425"/>
+        <a:ext cx="47999" cy="47999"/>
       </dsp:txXfrm>
     </dsp:sp>
-    <dsp:sp modelId="{0839EF7C-F436-4435-A481-3646916AD670}">
+    <dsp:sp modelId="{5610D7B2-34B4-49A3-B461-3B83E6A9038E}">
       <dsp:nvSpPr>
         <dsp:cNvPr id="0" name=""/>
         <dsp:cNvSpPr/>
       </dsp:nvSpPr>
       <dsp:spPr>
         <a:xfrm>
-          <a:off x="5988050" y="2789502"/>
-          <a:ext cx="2137833" cy="1068916"/>
+          <a:off x="5297487" y="3154759"/>
+          <a:ext cx="1370541" cy="685270"/>
         </a:xfrm>
         <a:prstGeom prst="roundRect">
           <a:avLst>
@@ -2225,12 +3002,12 @@
         </a:fontRef>
       </dsp:style>
       <dsp:txBody>
-        <a:bodyPr spcFirstLastPara="0" vert="horz" wrap="square" lIns="13970" tIns="13970" rIns="13970" bIns="13970" numCol="1" spcCol="1270" anchor="ctr" anchorCtr="0">
+        <a:bodyPr spcFirstLastPara="0" vert="horz" wrap="square" lIns="8890" tIns="8890" rIns="8890" bIns="8890" numCol="1" spcCol="1270" anchor="ctr" anchorCtr="0">
           <a:noAutofit/>
         </a:bodyPr>
         <a:lstStyle/>
         <a:p>
-          <a:pPr marL="0" lvl="0" indent="0" algn="ctr" defTabSz="977900">
+          <a:pPr marL="0" lvl="0" indent="0" algn="ctr" defTabSz="622300">
             <a:lnSpc>
               <a:spcPct val="90000"/>
             </a:lnSpc>
@@ -2243,25 +3020,26 @@
             <a:buNone/>
           </a:pPr>
           <a:r>
-            <a:rPr lang="en-US" sz="2200" kern="1200" dirty="0"/>
-            <a:t>Habitat for important species is present</a:t>
+            <a:rPr lang="en-US" sz="1400" kern="1200"/>
+            <a:t>Isolation is high</a:t>
           </a:r>
+          <a:endParaRPr lang="en-US" sz="1400" kern="1200" dirty="0"/>
         </a:p>
       </dsp:txBody>
       <dsp:txXfrm>
-        <a:off x="6019357" y="2820809"/>
-        <a:ext cx="2075219" cy="1006302"/>
+        <a:off x="5317558" y="3174830"/>
+        <a:ext cx="1330399" cy="645128"/>
       </dsp:txXfrm>
     </dsp:sp>
-    <dsp:sp modelId="{11292AF2-07BF-401D-A1C9-29192876F5FA}">
+    <dsp:sp modelId="{40ED7B85-DA85-416F-AE28-F4DD8067B665}">
       <dsp:nvSpPr>
         <dsp:cNvPr id="0" name=""/>
         <dsp:cNvSpPr/>
       </dsp:nvSpPr>
       <dsp:spPr>
-        <a:xfrm rot="2142401">
-          <a:off x="5033933" y="4228147"/>
-          <a:ext cx="1053099" cy="35507"/>
+        <a:xfrm>
+          <a:off x="4749270" y="4274074"/>
+          <a:ext cx="548216" cy="22763"/>
         </a:xfrm>
         <a:custGeom>
           <a:avLst/>
@@ -2272,10 +3050,10 @@
           <a:pathLst>
             <a:path>
               <a:moveTo>
-                <a:pt x="0" y="17753"/>
+                <a:pt x="0" y="11381"/>
               </a:moveTo>
               <a:lnTo>
-                <a:pt x="1053099" y="17753"/>
+                <a:pt x="548216" y="11381"/>
               </a:lnTo>
             </a:path>
           </a:pathLst>
@@ -2330,19 +3108,19 @@
         </a:p>
       </dsp:txBody>
       <dsp:txXfrm>
-        <a:off x="5534155" y="4219573"/>
-        <a:ext cx="52654" cy="52654"/>
+        <a:off x="5009673" y="4271751"/>
+        <a:ext cx="27410" cy="27410"/>
       </dsp:txXfrm>
     </dsp:sp>
-    <dsp:sp modelId="{4878B0CD-1E68-4E4F-B15A-8E8637FE59A3}">
+    <dsp:sp modelId="{0E2ACD24-4708-4A0E-B9DE-C3DAECC0A3EF}">
       <dsp:nvSpPr>
         <dsp:cNvPr id="0" name=""/>
         <dsp:cNvSpPr/>
       </dsp:nvSpPr>
       <dsp:spPr>
         <a:xfrm>
-          <a:off x="5988050" y="4018756"/>
-          <a:ext cx="2137833" cy="1068916"/>
+          <a:off x="5297487" y="3942821"/>
+          <a:ext cx="1370541" cy="685270"/>
         </a:xfrm>
         <a:prstGeom prst="roundRect">
           <a:avLst>
@@ -2386,12 +3164,12 @@
         </a:fontRef>
       </dsp:style>
       <dsp:txBody>
-        <a:bodyPr spcFirstLastPara="0" vert="horz" wrap="square" lIns="13970" tIns="13970" rIns="13970" bIns="13970" numCol="1" spcCol="1270" anchor="ctr" anchorCtr="0">
+        <a:bodyPr spcFirstLastPara="0" vert="horz" wrap="square" lIns="8890" tIns="8890" rIns="8890" bIns="8890" numCol="1" spcCol="1270" anchor="ctr" anchorCtr="0">
           <a:noAutofit/>
         </a:bodyPr>
         <a:lstStyle/>
         <a:p>
-          <a:pPr marL="0" lvl="0" indent="0" algn="ctr" defTabSz="977900">
+          <a:pPr marL="0" lvl="0" indent="0" algn="ctr" defTabSz="622300">
             <a:lnSpc>
               <a:spcPct val="90000"/>
             </a:lnSpc>
@@ -2403,12 +3181,176 @@
             </a:spcAft>
             <a:buNone/>
           </a:pPr>
-          <a:endParaRPr lang="en-US" sz="2200" kern="1200" dirty="0"/>
+          <a:r>
+            <a:rPr lang="en-US" sz="1400" kern="1200" dirty="0"/>
+            <a:t>Proportion of area of land cover type is low</a:t>
+          </a:r>
         </a:p>
       </dsp:txBody>
       <dsp:txXfrm>
-        <a:off x="6019357" y="4050063"/>
-        <a:ext cx="2075219" cy="1006302"/>
+        <a:off x="5317558" y="3962892"/>
+        <a:ext cx="1330399" cy="645128"/>
+      </dsp:txXfrm>
+    </dsp:sp>
+    <dsp:sp modelId="{FA38C550-A4E9-4E0C-A543-E976AFC6F9AC}">
+      <dsp:nvSpPr>
+        <dsp:cNvPr id="0" name=""/>
+        <dsp:cNvSpPr/>
+      </dsp:nvSpPr>
+      <dsp:spPr>
+        <a:xfrm rot="3310531">
+          <a:off x="4543383" y="4668105"/>
+          <a:ext cx="959990" cy="22763"/>
+        </a:xfrm>
+        <a:custGeom>
+          <a:avLst/>
+          <a:gdLst/>
+          <a:ahLst/>
+          <a:cxnLst/>
+          <a:rect l="0" t="0" r="0" b="0"/>
+          <a:pathLst>
+            <a:path>
+              <a:moveTo>
+                <a:pt x="0" y="11381"/>
+              </a:moveTo>
+              <a:lnTo>
+                <a:pt x="959990" y="11381"/>
+              </a:lnTo>
+            </a:path>
+          </a:pathLst>
+        </a:custGeom>
+        <a:noFill/>
+        <a:ln w="12700" cap="flat" cmpd="sng" algn="ctr">
+          <a:solidFill>
+            <a:schemeClr val="accent1">
+              <a:shade val="80000"/>
+              <a:hueOff val="0"/>
+              <a:satOff val="0"/>
+              <a:lumOff val="0"/>
+              <a:alphaOff val="0"/>
+            </a:schemeClr>
+          </a:solidFill>
+          <a:prstDash val="solid"/>
+          <a:miter lim="800000"/>
+        </a:ln>
+        <a:effectLst/>
+      </dsp:spPr>
+      <dsp:style>
+        <a:lnRef idx="2">
+          <a:scrgbClr r="0" g="0" b="0"/>
+        </a:lnRef>
+        <a:fillRef idx="0">
+          <a:scrgbClr r="0" g="0" b="0"/>
+        </a:fillRef>
+        <a:effectRef idx="0">
+          <a:scrgbClr r="0" g="0" b="0"/>
+        </a:effectRef>
+        <a:fontRef idx="minor"/>
+      </dsp:style>
+      <dsp:txBody>
+        <a:bodyPr spcFirstLastPara="0" vert="horz" wrap="square" lIns="12700" tIns="0" rIns="12700" bIns="0" numCol="1" spcCol="1270" anchor="ctr" anchorCtr="0">
+          <a:noAutofit/>
+        </a:bodyPr>
+        <a:lstStyle/>
+        <a:p>
+          <a:pPr marL="0" lvl="0" indent="0" algn="ctr" defTabSz="222250">
+            <a:lnSpc>
+              <a:spcPct val="90000"/>
+            </a:lnSpc>
+            <a:spcBef>
+              <a:spcPct val="0"/>
+            </a:spcBef>
+            <a:spcAft>
+              <a:spcPct val="35000"/>
+            </a:spcAft>
+            <a:buNone/>
+          </a:pPr>
+          <a:endParaRPr lang="en-US" sz="500" kern="1200"/>
+        </a:p>
+      </dsp:txBody>
+      <dsp:txXfrm>
+        <a:off x="4999379" y="4655487"/>
+        <a:ext cx="47999" cy="47999"/>
+      </dsp:txXfrm>
+    </dsp:sp>
+    <dsp:sp modelId="{05210038-F275-4A49-9050-86DAC9D5F021}">
+      <dsp:nvSpPr>
+        <dsp:cNvPr id="0" name=""/>
+        <dsp:cNvSpPr/>
+      </dsp:nvSpPr>
+      <dsp:spPr>
+        <a:xfrm>
+          <a:off x="5297487" y="4730882"/>
+          <a:ext cx="1370541" cy="685270"/>
+        </a:xfrm>
+        <a:prstGeom prst="roundRect">
+          <a:avLst>
+            <a:gd name="adj" fmla="val 10000"/>
+          </a:avLst>
+        </a:prstGeom>
+        <a:solidFill>
+          <a:schemeClr val="accent1">
+            <a:hueOff val="0"/>
+            <a:satOff val="0"/>
+            <a:lumOff val="0"/>
+            <a:alphaOff val="0"/>
+          </a:schemeClr>
+        </a:solidFill>
+        <a:ln w="12700" cap="flat" cmpd="sng" algn="ctr">
+          <a:solidFill>
+            <a:schemeClr val="lt1">
+              <a:hueOff val="0"/>
+              <a:satOff val="0"/>
+              <a:lumOff val="0"/>
+              <a:alphaOff val="0"/>
+            </a:schemeClr>
+          </a:solidFill>
+          <a:prstDash val="solid"/>
+          <a:miter lim="800000"/>
+        </a:ln>
+        <a:effectLst/>
+      </dsp:spPr>
+      <dsp:style>
+        <a:lnRef idx="2">
+          <a:scrgbClr r="0" g="0" b="0"/>
+        </a:lnRef>
+        <a:fillRef idx="1">
+          <a:scrgbClr r="0" g="0" b="0"/>
+        </a:fillRef>
+        <a:effectRef idx="0">
+          <a:scrgbClr r="0" g="0" b="0"/>
+        </a:effectRef>
+        <a:fontRef idx="minor">
+          <a:schemeClr val="lt1"/>
+        </a:fontRef>
+      </dsp:style>
+      <dsp:txBody>
+        <a:bodyPr spcFirstLastPara="0" vert="horz" wrap="square" lIns="8890" tIns="8890" rIns="8890" bIns="8890" numCol="1" spcCol="1270" anchor="ctr" anchorCtr="0">
+          <a:noAutofit/>
+        </a:bodyPr>
+        <a:lstStyle/>
+        <a:p>
+          <a:pPr marL="0" lvl="0" indent="0" algn="ctr" defTabSz="622300">
+            <a:lnSpc>
+              <a:spcPct val="90000"/>
+            </a:lnSpc>
+            <a:spcBef>
+              <a:spcPct val="0"/>
+            </a:spcBef>
+            <a:spcAft>
+              <a:spcPct val="35000"/>
+            </a:spcAft>
+            <a:buNone/>
+          </a:pPr>
+          <a:r>
+            <a:rPr lang="en-US" sz="1400" kern="1200" dirty="0"/>
+            <a:t>Stand age is high</a:t>
+          </a:r>
+        </a:p>
+      </dsp:txBody>
+      <dsp:txXfrm>
+        <a:off x="5317558" y="4750953"/>
+        <a:ext cx="1330399" cy="645128"/>
       </dsp:txXfrm>
     </dsp:sp>
   </dsp:spTree>
@@ -3916,7 +4858,7 @@
           <a:p>
             <a:fld id="{70CBB9DD-CC80-4FEF-9336-E7E3F56CEDDC}" type="datetimeFigureOut">
               <a:rPr lang="en-US" smtClean="0"/>
-              <a:t>8/10/2017</a:t>
+              <a:t>8/11/2017</a:t>
             </a:fld>
             <a:endParaRPr lang="en-US"/>
           </a:p>
@@ -4114,7 +5056,7 @@
           <a:p>
             <a:fld id="{70CBB9DD-CC80-4FEF-9336-E7E3F56CEDDC}" type="datetimeFigureOut">
               <a:rPr lang="en-US" smtClean="0"/>
-              <a:t>8/10/2017</a:t>
+              <a:t>8/11/2017</a:t>
             </a:fld>
             <a:endParaRPr lang="en-US"/>
           </a:p>
@@ -4322,7 +5264,7 @@
           <a:p>
             <a:fld id="{70CBB9DD-CC80-4FEF-9336-E7E3F56CEDDC}" type="datetimeFigureOut">
               <a:rPr lang="en-US" smtClean="0"/>
-              <a:t>8/10/2017</a:t>
+              <a:t>8/11/2017</a:t>
             </a:fld>
             <a:endParaRPr lang="en-US"/>
           </a:p>
@@ -4520,7 +5462,7 @@
           <a:p>
             <a:fld id="{70CBB9DD-CC80-4FEF-9336-E7E3F56CEDDC}" type="datetimeFigureOut">
               <a:rPr lang="en-US" smtClean="0"/>
-              <a:t>8/10/2017</a:t>
+              <a:t>8/11/2017</a:t>
             </a:fld>
             <a:endParaRPr lang="en-US"/>
           </a:p>
@@ -4795,7 +5737,7 @@
           <a:p>
             <a:fld id="{70CBB9DD-CC80-4FEF-9336-E7E3F56CEDDC}" type="datetimeFigureOut">
               <a:rPr lang="en-US" smtClean="0"/>
-              <a:t>8/10/2017</a:t>
+              <a:t>8/11/2017</a:t>
             </a:fld>
             <a:endParaRPr lang="en-US"/>
           </a:p>
@@ -5060,7 +6002,7 @@
           <a:p>
             <a:fld id="{70CBB9DD-CC80-4FEF-9336-E7E3F56CEDDC}" type="datetimeFigureOut">
               <a:rPr lang="en-US" smtClean="0"/>
-              <a:t>8/10/2017</a:t>
+              <a:t>8/11/2017</a:t>
             </a:fld>
             <a:endParaRPr lang="en-US"/>
           </a:p>
@@ -5472,7 +6414,7 @@
           <a:p>
             <a:fld id="{70CBB9DD-CC80-4FEF-9336-E7E3F56CEDDC}" type="datetimeFigureOut">
               <a:rPr lang="en-US" smtClean="0"/>
-              <a:t>8/10/2017</a:t>
+              <a:t>8/11/2017</a:t>
             </a:fld>
             <a:endParaRPr lang="en-US"/>
           </a:p>
@@ -5613,7 +6555,7 @@
           <a:p>
             <a:fld id="{70CBB9DD-CC80-4FEF-9336-E7E3F56CEDDC}" type="datetimeFigureOut">
               <a:rPr lang="en-US" smtClean="0"/>
-              <a:t>8/10/2017</a:t>
+              <a:t>8/11/2017</a:t>
             </a:fld>
             <a:endParaRPr lang="en-US"/>
           </a:p>
@@ -5726,7 +6668,7 @@
           <a:p>
             <a:fld id="{70CBB9DD-CC80-4FEF-9336-E7E3F56CEDDC}" type="datetimeFigureOut">
               <a:rPr lang="en-US" smtClean="0"/>
-              <a:t>8/10/2017</a:t>
+              <a:t>8/11/2017</a:t>
             </a:fld>
             <a:endParaRPr lang="en-US"/>
           </a:p>
@@ -6037,7 +6979,7 @@
           <a:p>
             <a:fld id="{70CBB9DD-CC80-4FEF-9336-E7E3F56CEDDC}" type="datetimeFigureOut">
               <a:rPr lang="en-US" smtClean="0"/>
-              <a:t>8/10/2017</a:t>
+              <a:t>8/11/2017</a:t>
             </a:fld>
             <a:endParaRPr lang="en-US"/>
           </a:p>
@@ -6325,7 +7267,7 @@
           <a:p>
             <a:fld id="{70CBB9DD-CC80-4FEF-9336-E7E3F56CEDDC}" type="datetimeFigureOut">
               <a:rPr lang="en-US" smtClean="0"/>
-              <a:t>8/10/2017</a:t>
+              <a:t>8/11/2017</a:t>
             </a:fld>
             <a:endParaRPr lang="en-US"/>
           </a:p>
@@ -6566,7 +7508,7 @@
           <a:p>
             <a:fld id="{70CBB9DD-CC80-4FEF-9336-E7E3F56CEDDC}" type="datetimeFigureOut">
               <a:rPr lang="en-US" smtClean="0"/>
-              <a:t>8/10/2017</a:t>
+              <a:t>8/11/2017</a:t>
             </a:fld>
             <a:endParaRPr lang="en-US"/>
           </a:p>
@@ -7076,7 +8018,7 @@
           <p:nvPr>
             <p:extLst>
               <p:ext uri="{D42A27DB-BD31-4B8C-83A1-F6EECF244321}">
-                <p14:modId xmlns:p14="http://schemas.microsoft.com/office/powerpoint/2010/main" val="4171419624"/>
+                <p14:modId xmlns:p14="http://schemas.microsoft.com/office/powerpoint/2010/main" val="2520939944"/>
               </p:ext>
             </p:extLst>
           </p:nvPr>
@@ -7095,6 +8037,173 @@
     <p:extLst>
       <p:ext uri="{BB962C8B-B14F-4D97-AF65-F5344CB8AC3E}">
         <p14:creationId xmlns:p14="http://schemas.microsoft.com/office/powerpoint/2010/main" val="1000811389"/>
+      </p:ext>
+    </p:extLst>
+  </p:cSld>
+  <p:clrMapOvr>
+    <a:masterClrMapping/>
+  </p:clrMapOvr>
+</p:sld>
+</file>
+
+<file path=ppt/slides/slide3.xml><?xml version="1.0" encoding="utf-8"?>
+<p:sld xmlns:a="http://schemas.openxmlformats.org/drawingml/2006/main" xmlns:r="http://schemas.openxmlformats.org/officeDocument/2006/relationships" xmlns:p="http://schemas.openxmlformats.org/presentationml/2006/main">
+  <p:cSld>
+    <p:spTree>
+      <p:nvGrpSpPr>
+        <p:cNvPr id="1" name=""/>
+        <p:cNvGrpSpPr/>
+        <p:nvPr/>
+      </p:nvGrpSpPr>
+      <p:grpSpPr>
+        <a:xfrm>
+          <a:off x="0" y="0"/>
+          <a:ext cx="0" cy="0"/>
+          <a:chOff x="0" y="0"/>
+          <a:chExt cx="0" cy="0"/>
+        </a:xfrm>
+      </p:grpSpPr>
+      <p:pic>
+        <p:nvPicPr>
+          <p:cNvPr id="7" name="Picture 6">
+            <a:extLst>
+              <a:ext uri="{FF2B5EF4-FFF2-40B4-BE49-F238E27FC236}">
+                <a16:creationId xmlns:a16="http://schemas.microsoft.com/office/drawing/2014/main" id="{19F10E4A-6B30-42E5-841C-193628B1D34D}"/>
+              </a:ext>
+            </a:extLst>
+          </p:cNvPr>
+          <p:cNvPicPr>
+            <a:picLocks noChangeAspect="1"/>
+          </p:cNvPicPr>
+          <p:nvPr/>
+        </p:nvPicPr>
+        <p:blipFill>
+          <a:blip r:embed="rId2">
+            <a:extLst>
+              <a:ext uri="{28A0092B-C50C-407E-A947-70E740481C1C}">
+                <a14:useLocalDpi xmlns:a14="http://schemas.microsoft.com/office/drawing/2010/main" val="0"/>
+              </a:ext>
+            </a:extLst>
+          </a:blip>
+          <a:stretch>
+            <a:fillRect/>
+          </a:stretch>
+        </p:blipFill>
+        <p:spPr>
+          <a:xfrm>
+            <a:off x="838200" y="123825"/>
+            <a:ext cx="10515600" cy="6610350"/>
+          </a:xfrm>
+          <a:prstGeom prst="rect">
+            <a:avLst/>
+          </a:prstGeom>
+        </p:spPr>
+      </p:pic>
+      <p:sp>
+        <p:nvSpPr>
+          <p:cNvPr id="8" name="TextBox 7">
+            <a:extLst>
+              <a:ext uri="{FF2B5EF4-FFF2-40B4-BE49-F238E27FC236}">
+                <a16:creationId xmlns:a16="http://schemas.microsoft.com/office/drawing/2014/main" id="{411E4ACC-BD70-401D-8BC9-A4CFC8BB7442}"/>
+              </a:ext>
+            </a:extLst>
+          </p:cNvPr>
+          <p:cNvSpPr txBox="1"/>
+          <p:nvPr/>
+        </p:nvSpPr>
+        <p:spPr>
+          <a:xfrm>
+            <a:off x="304800" y="417689"/>
+            <a:ext cx="894540" cy="369332"/>
+          </a:xfrm>
+          <a:prstGeom prst="rect">
+            <a:avLst/>
+          </a:prstGeom>
+          <a:noFill/>
+        </p:spPr>
+        <p:txBody>
+          <a:bodyPr wrap="none" rtlCol="0">
+            <a:spAutoFit/>
+          </a:bodyPr>
+          <a:lstStyle/>
+          <a:p>
+            <a:r>
+              <a:rPr lang="en-US" dirty="0"/>
+              <a:t>Draw.io</a:t>
+            </a:r>
+          </a:p>
+        </p:txBody>
+      </p:sp>
+    </p:spTree>
+    <p:extLst>
+      <p:ext uri="{BB962C8B-B14F-4D97-AF65-F5344CB8AC3E}">
+        <p14:creationId xmlns:p14="http://schemas.microsoft.com/office/powerpoint/2010/main" val="1832549608"/>
+      </p:ext>
+    </p:extLst>
+  </p:cSld>
+  <p:clrMapOvr>
+    <a:masterClrMapping/>
+  </p:clrMapOvr>
+</p:sld>
+</file>
+
+<file path=ppt/slides/slide4.xml><?xml version="1.0" encoding="utf-8"?>
+<p:sld xmlns:a="http://schemas.openxmlformats.org/drawingml/2006/main" xmlns:r="http://schemas.openxmlformats.org/officeDocument/2006/relationships" xmlns:p="http://schemas.openxmlformats.org/presentationml/2006/main">
+  <p:cSld>
+    <p:spTree>
+      <p:nvGrpSpPr>
+        <p:cNvPr id="1" name=""/>
+        <p:cNvGrpSpPr/>
+        <p:nvPr/>
+      </p:nvGrpSpPr>
+      <p:grpSpPr>
+        <a:xfrm>
+          <a:off x="0" y="0"/>
+          <a:ext cx="0" cy="0"/>
+          <a:chOff x="0" y="0"/>
+          <a:chExt cx="0" cy="0"/>
+        </a:xfrm>
+      </p:grpSpPr>
+      <p:pic>
+        <p:nvPicPr>
+          <p:cNvPr id="3" name="Picture 2">
+            <a:extLst>
+              <a:ext uri="{FF2B5EF4-FFF2-40B4-BE49-F238E27FC236}">
+                <a16:creationId xmlns:a16="http://schemas.microsoft.com/office/drawing/2014/main" id="{0BCA8726-2556-4C19-9A32-729E91B41B0E}"/>
+              </a:ext>
+            </a:extLst>
+          </p:cNvPr>
+          <p:cNvPicPr>
+            <a:picLocks noChangeAspect="1"/>
+          </p:cNvPicPr>
+          <p:nvPr/>
+        </p:nvPicPr>
+        <p:blipFill>
+          <a:blip r:embed="rId2">
+            <a:extLst>
+              <a:ext uri="{28A0092B-C50C-407E-A947-70E740481C1C}">
+                <a14:useLocalDpi xmlns:a14="http://schemas.microsoft.com/office/drawing/2010/main" val="0"/>
+              </a:ext>
+            </a:extLst>
+          </a:blip>
+          <a:stretch>
+            <a:fillRect/>
+          </a:stretch>
+        </p:blipFill>
+        <p:spPr>
+          <a:xfrm>
+            <a:off x="2758816" y="0"/>
+            <a:ext cx="6674367" cy="6858000"/>
+          </a:xfrm>
+          <a:prstGeom prst="rect">
+            <a:avLst/>
+          </a:prstGeom>
+        </p:spPr>
+      </p:pic>
+    </p:spTree>
+    <p:extLst>
+      <p:ext uri="{BB962C8B-B14F-4D97-AF65-F5344CB8AC3E}">
+        <p14:creationId xmlns:p14="http://schemas.microsoft.com/office/powerpoint/2010/main" val="4225401076"/>
       </p:ext>
     </p:extLst>
   </p:cSld>

</xml_diff>